<commit_message>
Flow conversion, manual and report
</commit_message>
<xml_diff>
--- a/Documentation/PALMY_Manual.pptx
+++ b/Documentation/PALMY_Manual.pptx
@@ -6,6 +6,21 @@
   </p:sldMasterIdLst>
   <p:sldIdLst>
     <p:sldId id="256" r:id="rId2"/>
+    <p:sldId id="262" r:id="rId3"/>
+    <p:sldId id="257" r:id="rId4"/>
+    <p:sldId id="263" r:id="rId5"/>
+    <p:sldId id="264" r:id="rId6"/>
+    <p:sldId id="265" r:id="rId7"/>
+    <p:sldId id="258" r:id="rId8"/>
+    <p:sldId id="266" r:id="rId9"/>
+    <p:sldId id="261" r:id="rId10"/>
+    <p:sldId id="272" r:id="rId11"/>
+    <p:sldId id="267" r:id="rId12"/>
+    <p:sldId id="259" r:id="rId13"/>
+    <p:sldId id="269" r:id="rId14"/>
+    <p:sldId id="268" r:id="rId15"/>
+    <p:sldId id="270" r:id="rId16"/>
+    <p:sldId id="271" r:id="rId17"/>
   </p:sldIdLst>
   <p:sldSz cx="12192000" cy="6858000"/>
   <p:notesSz cx="6858000" cy="9144000"/>
@@ -104,6 +119,11 @@
       </a:defRPr>
     </a:lvl9pPr>
   </p:defaultTextStyle>
+  <p:extLst>
+    <p:ext uri="{EFAFB233-063F-42B5-8137-9DF3F51BA10A}">
+      <p15:sldGuideLst xmlns:p15="http://schemas.microsoft.com/office/powerpoint/2012/main"/>
+    </p:ext>
+  </p:extLst>
 </p:presentation>
 </file>
 
@@ -256,7 +276,7 @@
           <a:p>
             <a:fld id="{E06079E8-A65D-4CE8-9633-246532D52F20}" type="datetimeFigureOut">
               <a:rPr lang="it-CH" smtClean="0"/>
-              <a:t>14.06.2023</a:t>
+              <a:t>15.06.2023</a:t>
             </a:fld>
             <a:endParaRPr lang="it-CH"/>
           </a:p>
@@ -456,7 +476,7 @@
           <a:p>
             <a:fld id="{E06079E8-A65D-4CE8-9633-246532D52F20}" type="datetimeFigureOut">
               <a:rPr lang="it-CH" smtClean="0"/>
-              <a:t>14.06.2023</a:t>
+              <a:t>15.06.2023</a:t>
             </a:fld>
             <a:endParaRPr lang="it-CH"/>
           </a:p>
@@ -666,7 +686,7 @@
           <a:p>
             <a:fld id="{E06079E8-A65D-4CE8-9633-246532D52F20}" type="datetimeFigureOut">
               <a:rPr lang="it-CH" smtClean="0"/>
-              <a:t>14.06.2023</a:t>
+              <a:t>15.06.2023</a:t>
             </a:fld>
             <a:endParaRPr lang="it-CH"/>
           </a:p>
@@ -866,7 +886,7 @@
           <a:p>
             <a:fld id="{E06079E8-A65D-4CE8-9633-246532D52F20}" type="datetimeFigureOut">
               <a:rPr lang="it-CH" smtClean="0"/>
-              <a:t>14.06.2023</a:t>
+              <a:t>15.06.2023</a:t>
             </a:fld>
             <a:endParaRPr lang="it-CH"/>
           </a:p>
@@ -1142,7 +1162,7 @@
           <a:p>
             <a:fld id="{E06079E8-A65D-4CE8-9633-246532D52F20}" type="datetimeFigureOut">
               <a:rPr lang="it-CH" smtClean="0"/>
-              <a:t>14.06.2023</a:t>
+              <a:t>15.06.2023</a:t>
             </a:fld>
             <a:endParaRPr lang="it-CH"/>
           </a:p>
@@ -1410,7 +1430,7 @@
           <a:p>
             <a:fld id="{E06079E8-A65D-4CE8-9633-246532D52F20}" type="datetimeFigureOut">
               <a:rPr lang="it-CH" smtClean="0"/>
-              <a:t>14.06.2023</a:t>
+              <a:t>15.06.2023</a:t>
             </a:fld>
             <a:endParaRPr lang="it-CH"/>
           </a:p>
@@ -1825,7 +1845,7 @@
           <a:p>
             <a:fld id="{E06079E8-A65D-4CE8-9633-246532D52F20}" type="datetimeFigureOut">
               <a:rPr lang="it-CH" smtClean="0"/>
-              <a:t>14.06.2023</a:t>
+              <a:t>15.06.2023</a:t>
             </a:fld>
             <a:endParaRPr lang="it-CH"/>
           </a:p>
@@ -1967,7 +1987,7 @@
           <a:p>
             <a:fld id="{E06079E8-A65D-4CE8-9633-246532D52F20}" type="datetimeFigureOut">
               <a:rPr lang="it-CH" smtClean="0"/>
-              <a:t>14.06.2023</a:t>
+              <a:t>15.06.2023</a:t>
             </a:fld>
             <a:endParaRPr lang="it-CH"/>
           </a:p>
@@ -2080,7 +2100,7 @@
           <a:p>
             <a:fld id="{E06079E8-A65D-4CE8-9633-246532D52F20}" type="datetimeFigureOut">
               <a:rPr lang="it-CH" smtClean="0"/>
-              <a:t>14.06.2023</a:t>
+              <a:t>15.06.2023</a:t>
             </a:fld>
             <a:endParaRPr lang="it-CH"/>
           </a:p>
@@ -2393,7 +2413,7 @@
           <a:p>
             <a:fld id="{E06079E8-A65D-4CE8-9633-246532D52F20}" type="datetimeFigureOut">
               <a:rPr lang="it-CH" smtClean="0"/>
-              <a:t>14.06.2023</a:t>
+              <a:t>15.06.2023</a:t>
             </a:fld>
             <a:endParaRPr lang="it-CH"/>
           </a:p>
@@ -2682,7 +2702,7 @@
           <a:p>
             <a:fld id="{E06079E8-A65D-4CE8-9633-246532D52F20}" type="datetimeFigureOut">
               <a:rPr lang="it-CH" smtClean="0"/>
-              <a:t>14.06.2023</a:t>
+              <a:t>15.06.2023</a:t>
             </a:fld>
             <a:endParaRPr lang="it-CH"/>
           </a:p>
@@ -2925,7 +2945,7 @@
           <a:p>
             <a:fld id="{E06079E8-A65D-4CE8-9633-246532D52F20}" type="datetimeFigureOut">
               <a:rPr lang="it-CH" smtClean="0"/>
-              <a:t>14.06.2023</a:t>
+              <a:t>15.06.2023</a:t>
             </a:fld>
             <a:endParaRPr lang="it-CH"/>
           </a:p>
@@ -3399,7 +3419,7 @@
           <a:p>
             <a:r>
               <a:rPr lang="it-CH" dirty="0"/>
-              <a:t>14.06.2023</a:t>
+              <a:t>16.06.2023</a:t>
             </a:r>
           </a:p>
         </p:txBody>
@@ -3408,6 +3428,3086 @@
     <p:extLst>
       <p:ext uri="{BB962C8B-B14F-4D97-AF65-F5344CB8AC3E}">
         <p14:creationId xmlns:p14="http://schemas.microsoft.com/office/powerpoint/2010/main" val="216397826"/>
+      </p:ext>
+    </p:extLst>
+  </p:cSld>
+  <p:clrMapOvr>
+    <a:masterClrMapping/>
+  </p:clrMapOvr>
+</p:sld>
+</file>
+
+<file path=ppt/slides/slide10.xml><?xml version="1.0" encoding="utf-8"?>
+<p:sld xmlns:a="http://schemas.openxmlformats.org/drawingml/2006/main" xmlns:r="http://schemas.openxmlformats.org/officeDocument/2006/relationships" xmlns:p="http://schemas.openxmlformats.org/presentationml/2006/main">
+  <p:cSld>
+    <p:spTree>
+      <p:nvGrpSpPr>
+        <p:cNvPr id="1" name=""/>
+        <p:cNvGrpSpPr/>
+        <p:nvPr/>
+      </p:nvGrpSpPr>
+      <p:grpSpPr>
+        <a:xfrm>
+          <a:off x="0" y="0"/>
+          <a:ext cx="0" cy="0"/>
+          <a:chOff x="0" y="0"/>
+          <a:chExt cx="0" cy="0"/>
+        </a:xfrm>
+      </p:grpSpPr>
+      <p:sp>
+        <p:nvSpPr>
+          <p:cNvPr id="2" name="Title 1">
+            <a:extLst>
+              <a:ext uri="{FF2B5EF4-FFF2-40B4-BE49-F238E27FC236}">
+                <a16:creationId xmlns:a16="http://schemas.microsoft.com/office/drawing/2014/main" id="{2AB63CDF-1FE1-F290-CCF0-13D0D18DC7AE}"/>
+              </a:ext>
+            </a:extLst>
+          </p:cNvPr>
+          <p:cNvSpPr>
+            <a:spLocks noGrp="1"/>
+          </p:cNvSpPr>
+          <p:nvPr>
+            <p:ph type="title"/>
+          </p:nvPr>
+        </p:nvSpPr>
+        <p:spPr/>
+        <p:txBody>
+          <a:bodyPr/>
+          <a:lstStyle/>
+          <a:p>
+            <a:r>
+              <a:rPr lang="it-CH" dirty="0" err="1"/>
+              <a:t>Thermero</a:t>
+            </a:r>
+            <a:endParaRPr lang="it-CH" dirty="0"/>
+          </a:p>
+        </p:txBody>
+      </p:sp>
+      <p:sp>
+        <p:nvSpPr>
+          <p:cNvPr id="3" name="Content Placeholder 2">
+            <a:extLst>
+              <a:ext uri="{FF2B5EF4-FFF2-40B4-BE49-F238E27FC236}">
+                <a16:creationId xmlns:a16="http://schemas.microsoft.com/office/drawing/2014/main" id="{0BD16F46-F803-4974-829C-B7558485AA8F}"/>
+              </a:ext>
+            </a:extLst>
+          </p:cNvPr>
+          <p:cNvSpPr>
+            <a:spLocks noGrp="1"/>
+          </p:cNvSpPr>
+          <p:nvPr>
+            <p:ph idx="1"/>
+          </p:nvPr>
+        </p:nvSpPr>
+        <p:spPr/>
+        <p:txBody>
+          <a:bodyPr/>
+          <a:lstStyle/>
+          <a:p>
+            <a:pPr marL="0" indent="0">
+              <a:buNone/>
+            </a:pPr>
+            <a:r>
+              <a:rPr lang="en-US" dirty="0"/>
+              <a:t>The </a:t>
+            </a:r>
+            <a:r>
+              <a:rPr lang="en-US" dirty="0" err="1"/>
+              <a:t>Thermero</a:t>
+            </a:r>
+            <a:r>
+              <a:rPr lang="en-US" dirty="0"/>
+              <a:t> sometimes encounters an error that can halt the process. The occurrence of this error remains unclear and unpredictable. To allow the 20 sensors to communicate effectively with the Raspberry Pi, a time sleep between sensor readings has been implemented, providing them with ample time.</a:t>
+            </a:r>
+            <a:endParaRPr lang="it-CH" dirty="0"/>
+          </a:p>
+        </p:txBody>
+      </p:sp>
+      <p:pic>
+        <p:nvPicPr>
+          <p:cNvPr id="5" name="Picture 4" descr="A screenshot of a computer&#10;&#10;Description automatically generated">
+            <a:extLst>
+              <a:ext uri="{FF2B5EF4-FFF2-40B4-BE49-F238E27FC236}">
+                <a16:creationId xmlns:a16="http://schemas.microsoft.com/office/drawing/2014/main" id="{E3D455B0-97D4-8A4D-F79B-EA5089316094}"/>
+              </a:ext>
+            </a:extLst>
+          </p:cNvPr>
+          <p:cNvPicPr>
+            <a:picLocks noChangeAspect="1"/>
+          </p:cNvPicPr>
+          <p:nvPr/>
+        </p:nvPicPr>
+        <p:blipFill rotWithShape="1">
+          <a:blip r:embed="rId2">
+            <a:extLst>
+              <a:ext uri="{28A0092B-C50C-407E-A947-70E740481C1C}">
+                <a14:useLocalDpi xmlns:a14="http://schemas.microsoft.com/office/drawing/2010/main" val="0"/>
+              </a:ext>
+            </a:extLst>
+          </a:blip>
+          <a:srcRect l="1250" t="66370" r="43167" b="5324"/>
+          <a:stretch/>
+        </p:blipFill>
+        <p:spPr>
+          <a:xfrm>
+            <a:off x="1299425" y="3926067"/>
+            <a:ext cx="9593150" cy="2747963"/>
+          </a:xfrm>
+          <a:prstGeom prst="rect">
+            <a:avLst/>
+          </a:prstGeom>
+        </p:spPr>
+      </p:pic>
+    </p:spTree>
+    <p:extLst>
+      <p:ext uri="{BB962C8B-B14F-4D97-AF65-F5344CB8AC3E}">
+        <p14:creationId xmlns:p14="http://schemas.microsoft.com/office/powerpoint/2010/main" val="1960638096"/>
+      </p:ext>
+    </p:extLst>
+  </p:cSld>
+  <p:clrMapOvr>
+    <a:masterClrMapping/>
+  </p:clrMapOvr>
+</p:sld>
+</file>
+
+<file path=ppt/slides/slide11.xml><?xml version="1.0" encoding="utf-8"?>
+<p:sld xmlns:a="http://schemas.openxmlformats.org/drawingml/2006/main" xmlns:r="http://schemas.openxmlformats.org/officeDocument/2006/relationships" xmlns:p="http://schemas.openxmlformats.org/presentationml/2006/main">
+  <p:cSld>
+    <p:spTree>
+      <p:nvGrpSpPr>
+        <p:cNvPr id="1" name=""/>
+        <p:cNvGrpSpPr/>
+        <p:nvPr/>
+      </p:nvGrpSpPr>
+      <p:grpSpPr>
+        <a:xfrm>
+          <a:off x="0" y="0"/>
+          <a:ext cx="0" cy="0"/>
+          <a:chOff x="0" y="0"/>
+          <a:chExt cx="0" cy="0"/>
+        </a:xfrm>
+      </p:grpSpPr>
+      <p:sp>
+        <p:nvSpPr>
+          <p:cNvPr id="4" name="Title 3">
+            <a:extLst>
+              <a:ext uri="{FF2B5EF4-FFF2-40B4-BE49-F238E27FC236}">
+                <a16:creationId xmlns:a16="http://schemas.microsoft.com/office/drawing/2014/main" id="{EA9B64C0-1340-A884-3044-2FFFCAAE644C}"/>
+              </a:ext>
+            </a:extLst>
+          </p:cNvPr>
+          <p:cNvSpPr>
+            <a:spLocks noGrp="1"/>
+          </p:cNvSpPr>
+          <p:nvPr>
+            <p:ph type="title"/>
+          </p:nvPr>
+        </p:nvSpPr>
+        <p:spPr/>
+        <p:txBody>
+          <a:bodyPr/>
+          <a:lstStyle/>
+          <a:p>
+            <a:r>
+              <a:rPr lang="it-CH" dirty="0"/>
+              <a:t>Save </a:t>
+            </a:r>
+            <a:r>
+              <a:rPr lang="it-CH" dirty="0" err="1"/>
+              <a:t>GIFs</a:t>
+            </a:r>
+            <a:endParaRPr lang="it-CH" dirty="0"/>
+          </a:p>
+        </p:txBody>
+      </p:sp>
+      <p:sp>
+        <p:nvSpPr>
+          <p:cNvPr id="5" name="Text Placeholder 4">
+            <a:extLst>
+              <a:ext uri="{FF2B5EF4-FFF2-40B4-BE49-F238E27FC236}">
+                <a16:creationId xmlns:a16="http://schemas.microsoft.com/office/drawing/2014/main" id="{1978CFC8-578A-471F-F3DA-27D09054C13C}"/>
+              </a:ext>
+            </a:extLst>
+          </p:cNvPr>
+          <p:cNvSpPr>
+            <a:spLocks noGrp="1"/>
+          </p:cNvSpPr>
+          <p:nvPr>
+            <p:ph type="body" idx="1"/>
+          </p:nvPr>
+        </p:nvSpPr>
+        <p:spPr/>
+        <p:txBody>
+          <a:bodyPr/>
+          <a:lstStyle/>
+          <a:p>
+            <a:r>
+              <a:rPr lang="it-CH" dirty="0"/>
+              <a:t>From </a:t>
+            </a:r>
+            <a:r>
+              <a:rPr lang="it-CH" dirty="0" err="1"/>
+              <a:t>Thermero</a:t>
+            </a:r>
+            <a:r>
+              <a:rPr lang="it-CH" dirty="0"/>
+              <a:t> and IR camera Data</a:t>
+            </a:r>
+          </a:p>
+        </p:txBody>
+      </p:sp>
+    </p:spTree>
+    <p:extLst>
+      <p:ext uri="{BB962C8B-B14F-4D97-AF65-F5344CB8AC3E}">
+        <p14:creationId xmlns:p14="http://schemas.microsoft.com/office/powerpoint/2010/main" val="2125102757"/>
+      </p:ext>
+    </p:extLst>
+  </p:cSld>
+  <p:clrMapOvr>
+    <a:masterClrMapping/>
+  </p:clrMapOvr>
+</p:sld>
+</file>
+
+<file path=ppt/slides/slide12.xml><?xml version="1.0" encoding="utf-8"?>
+<p:sld xmlns:a="http://schemas.openxmlformats.org/drawingml/2006/main" xmlns:r="http://schemas.openxmlformats.org/officeDocument/2006/relationships" xmlns:p="http://schemas.openxmlformats.org/presentationml/2006/main">
+  <p:cSld>
+    <p:spTree>
+      <p:nvGrpSpPr>
+        <p:cNvPr id="1" name=""/>
+        <p:cNvGrpSpPr/>
+        <p:nvPr/>
+      </p:nvGrpSpPr>
+      <p:grpSpPr>
+        <a:xfrm>
+          <a:off x="0" y="0"/>
+          <a:ext cx="0" cy="0"/>
+          <a:chOff x="0" y="0"/>
+          <a:chExt cx="0" cy="0"/>
+        </a:xfrm>
+      </p:grpSpPr>
+      <p:sp>
+        <p:nvSpPr>
+          <p:cNvPr id="2" name="Title 1">
+            <a:extLst>
+              <a:ext uri="{FF2B5EF4-FFF2-40B4-BE49-F238E27FC236}">
+                <a16:creationId xmlns:a16="http://schemas.microsoft.com/office/drawing/2014/main" id="{614625EF-EB1D-88AD-EFA0-8B5C7E4D3EF9}"/>
+              </a:ext>
+            </a:extLst>
+          </p:cNvPr>
+          <p:cNvSpPr>
+            <a:spLocks noGrp="1"/>
+          </p:cNvSpPr>
+          <p:nvPr>
+            <p:ph type="title"/>
+          </p:nvPr>
+        </p:nvSpPr>
+        <p:spPr/>
+        <p:txBody>
+          <a:bodyPr/>
+          <a:lstStyle/>
+          <a:p>
+            <a:r>
+              <a:rPr lang="it-CH" dirty="0"/>
+              <a:t>Save GIF</a:t>
+            </a:r>
+          </a:p>
+        </p:txBody>
+      </p:sp>
+      <p:sp>
+        <p:nvSpPr>
+          <p:cNvPr id="3" name="Content Placeholder 2">
+            <a:extLst>
+              <a:ext uri="{FF2B5EF4-FFF2-40B4-BE49-F238E27FC236}">
+                <a16:creationId xmlns:a16="http://schemas.microsoft.com/office/drawing/2014/main" id="{EE1B07E6-6E89-34EE-9984-4C067925AC1D}"/>
+              </a:ext>
+            </a:extLst>
+          </p:cNvPr>
+          <p:cNvSpPr>
+            <a:spLocks noGrp="1"/>
+          </p:cNvSpPr>
+          <p:nvPr>
+            <p:ph idx="1"/>
+          </p:nvPr>
+        </p:nvSpPr>
+        <p:spPr/>
+        <p:txBody>
+          <a:bodyPr/>
+          <a:lstStyle/>
+          <a:p>
+            <a:pPr marL="0" indent="0">
+              <a:buNone/>
+            </a:pPr>
+            <a:r>
+              <a:rPr lang="it-CH" dirty="0"/>
+              <a:t>After the data csv files are </a:t>
+            </a:r>
+            <a:r>
+              <a:rPr lang="it-CH" dirty="0" err="1"/>
+              <a:t>saved</a:t>
+            </a:r>
+            <a:r>
+              <a:rPr lang="it-CH" dirty="0"/>
+              <a:t> </a:t>
+            </a:r>
+            <a:r>
+              <a:rPr lang="it-CH" dirty="0" err="1"/>
+              <a:t>into</a:t>
+            </a:r>
+            <a:r>
+              <a:rPr lang="it-CH" dirty="0"/>
+              <a:t> the «Data» folder, you can follow </a:t>
+            </a:r>
+            <a:r>
+              <a:rPr lang="it-CH" dirty="0" err="1"/>
+              <a:t>these</a:t>
+            </a:r>
+            <a:r>
+              <a:rPr lang="it-CH" dirty="0"/>
+              <a:t> steps to create a GIF:</a:t>
+            </a:r>
+          </a:p>
+          <a:p>
+            <a:pPr marL="514350" indent="-514350">
+              <a:buFont typeface="+mj-lt"/>
+              <a:buAutoNum type="arabicPeriod"/>
+            </a:pPr>
+            <a:r>
+              <a:rPr lang="it-CH" dirty="0"/>
+              <a:t>Open «</a:t>
+            </a:r>
+            <a:r>
+              <a:rPr lang="it-CH" dirty="0" err="1"/>
+              <a:t>Generators</a:t>
+            </a:r>
+            <a:r>
+              <a:rPr lang="it-CH" dirty="0"/>
+              <a:t>» folder.</a:t>
+            </a:r>
+          </a:p>
+          <a:p>
+            <a:pPr marL="514350" indent="-514350">
+              <a:buFont typeface="+mj-lt"/>
+              <a:buAutoNum type="arabicPeriod"/>
+            </a:pPr>
+            <a:r>
+              <a:rPr lang="it-CH" dirty="0"/>
+              <a:t>Open «csv2gif.py».</a:t>
+            </a:r>
+          </a:p>
+          <a:p>
+            <a:pPr marL="514350" indent="-514350">
+              <a:buFont typeface="+mj-lt"/>
+              <a:buAutoNum type="arabicPeriod"/>
+            </a:pPr>
+            <a:r>
+              <a:rPr lang="it-CH" dirty="0" err="1"/>
+              <a:t>Run</a:t>
+            </a:r>
+            <a:r>
+              <a:rPr lang="it-CH" dirty="0"/>
+              <a:t> the code.</a:t>
+            </a:r>
+          </a:p>
+          <a:p>
+            <a:r>
+              <a:rPr lang="it-CH" dirty="0"/>
+              <a:t>Select the data file of </a:t>
+            </a:r>
+            <a:r>
+              <a:rPr lang="it-CH" dirty="0" err="1"/>
+              <a:t>interest</a:t>
+            </a:r>
+            <a:r>
+              <a:rPr lang="it-CH" dirty="0"/>
+              <a:t> by </a:t>
+            </a:r>
+            <a:r>
+              <a:rPr lang="it-CH" dirty="0" err="1"/>
+              <a:t>navigating</a:t>
+            </a:r>
+            <a:r>
+              <a:rPr lang="it-CH" dirty="0"/>
+              <a:t> the pop-up window. NB: The data are </a:t>
+            </a:r>
+            <a:r>
+              <a:rPr lang="it-CH" dirty="0" err="1"/>
+              <a:t>saved</a:t>
+            </a:r>
+            <a:r>
+              <a:rPr lang="it-CH" dirty="0"/>
+              <a:t> in the «Data» folder.</a:t>
+            </a:r>
+          </a:p>
+          <a:p>
+            <a:pPr marL="0" indent="0">
+              <a:buNone/>
+            </a:pPr>
+            <a:endParaRPr lang="it-CH" dirty="0"/>
+          </a:p>
+          <a:p>
+            <a:pPr marL="0" indent="0">
+              <a:buNone/>
+            </a:pPr>
+            <a:r>
+              <a:rPr lang="it-CH" dirty="0" err="1"/>
+              <a:t>Change</a:t>
+            </a:r>
+            <a:r>
+              <a:rPr lang="it-CH" dirty="0"/>
+              <a:t> Slide %</a:t>
+            </a:r>
+          </a:p>
+        </p:txBody>
+      </p:sp>
+    </p:spTree>
+    <p:extLst>
+      <p:ext uri="{BB962C8B-B14F-4D97-AF65-F5344CB8AC3E}">
+        <p14:creationId xmlns:p14="http://schemas.microsoft.com/office/powerpoint/2010/main" val="2325324399"/>
+      </p:ext>
+    </p:extLst>
+  </p:cSld>
+  <p:clrMapOvr>
+    <a:masterClrMapping/>
+  </p:clrMapOvr>
+</p:sld>
+</file>
+
+<file path=ppt/slides/slide13.xml><?xml version="1.0" encoding="utf-8"?>
+<p:sld xmlns:a="http://schemas.openxmlformats.org/drawingml/2006/main" xmlns:r="http://schemas.openxmlformats.org/officeDocument/2006/relationships" xmlns:p="http://schemas.openxmlformats.org/presentationml/2006/main">
+  <p:cSld>
+    <p:spTree>
+      <p:nvGrpSpPr>
+        <p:cNvPr id="1" name=""/>
+        <p:cNvGrpSpPr/>
+        <p:nvPr/>
+      </p:nvGrpSpPr>
+      <p:grpSpPr>
+        <a:xfrm>
+          <a:off x="0" y="0"/>
+          <a:ext cx="0" cy="0"/>
+          <a:chOff x="0" y="0"/>
+          <a:chExt cx="0" cy="0"/>
+        </a:xfrm>
+      </p:grpSpPr>
+      <p:sp>
+        <p:nvSpPr>
+          <p:cNvPr id="2" name="Title 1">
+            <a:extLst>
+              <a:ext uri="{FF2B5EF4-FFF2-40B4-BE49-F238E27FC236}">
+                <a16:creationId xmlns:a16="http://schemas.microsoft.com/office/drawing/2014/main" id="{614625EF-EB1D-88AD-EFA0-8B5C7E4D3EF9}"/>
+              </a:ext>
+            </a:extLst>
+          </p:cNvPr>
+          <p:cNvSpPr>
+            <a:spLocks noGrp="1"/>
+          </p:cNvSpPr>
+          <p:nvPr>
+            <p:ph type="title"/>
+          </p:nvPr>
+        </p:nvSpPr>
+        <p:spPr/>
+        <p:txBody>
+          <a:bodyPr/>
+          <a:lstStyle/>
+          <a:p>
+            <a:r>
+              <a:rPr lang="it-CH" dirty="0"/>
+              <a:t>Save GIF</a:t>
+            </a:r>
+          </a:p>
+        </p:txBody>
+      </p:sp>
+      <p:sp>
+        <p:nvSpPr>
+          <p:cNvPr id="3" name="Content Placeholder 2">
+            <a:extLst>
+              <a:ext uri="{FF2B5EF4-FFF2-40B4-BE49-F238E27FC236}">
+                <a16:creationId xmlns:a16="http://schemas.microsoft.com/office/drawing/2014/main" id="{EE1B07E6-6E89-34EE-9984-4C067925AC1D}"/>
+              </a:ext>
+            </a:extLst>
+          </p:cNvPr>
+          <p:cNvSpPr>
+            <a:spLocks noGrp="1"/>
+          </p:cNvSpPr>
+          <p:nvPr>
+            <p:ph idx="1"/>
+          </p:nvPr>
+        </p:nvSpPr>
+        <p:spPr/>
+        <p:txBody>
+          <a:bodyPr/>
+          <a:lstStyle/>
+          <a:p>
+            <a:r>
+              <a:rPr lang="it-CH" dirty="0" err="1"/>
+              <a:t>Enter</a:t>
+            </a:r>
+            <a:r>
+              <a:rPr lang="it-CH" dirty="0"/>
+              <a:t> the time ranges. To </a:t>
+            </a:r>
+            <a:r>
+              <a:rPr lang="it-CH" dirty="0" err="1"/>
+              <a:t>simplify</a:t>
+            </a:r>
+            <a:r>
+              <a:rPr lang="it-CH" dirty="0"/>
+              <a:t> </a:t>
+            </a:r>
+            <a:r>
+              <a:rPr lang="it-CH" dirty="0" err="1"/>
+              <a:t>this</a:t>
+            </a:r>
+            <a:r>
+              <a:rPr lang="it-CH" dirty="0"/>
+              <a:t> procedure, you can open the data file of </a:t>
+            </a:r>
+            <a:r>
+              <a:rPr lang="it-CH" dirty="0" err="1"/>
+              <a:t>interest</a:t>
+            </a:r>
+            <a:r>
+              <a:rPr lang="it-CH" dirty="0"/>
+              <a:t> with </a:t>
+            </a:r>
+            <a:r>
+              <a:rPr lang="it-CH" dirty="0" err="1"/>
+              <a:t>Gnumeric</a:t>
+            </a:r>
+            <a:r>
+              <a:rPr lang="it-CH" dirty="0"/>
+              <a:t> and copy and paste the </a:t>
+            </a:r>
+            <a:r>
+              <a:rPr lang="it-CH" dirty="0" err="1"/>
+              <a:t>value</a:t>
+            </a:r>
+            <a:r>
+              <a:rPr lang="it-CH" dirty="0"/>
+              <a:t> of the «Time» </a:t>
+            </a:r>
+            <a:r>
+              <a:rPr lang="it-CH" dirty="0" err="1"/>
+              <a:t>column</a:t>
+            </a:r>
+            <a:r>
+              <a:rPr lang="it-CH" dirty="0"/>
+              <a:t> (the first one on the </a:t>
+            </a:r>
+            <a:r>
+              <a:rPr lang="it-CH" dirty="0" err="1"/>
+              <a:t>left</a:t>
+            </a:r>
+            <a:r>
+              <a:rPr lang="it-CH" dirty="0"/>
+              <a:t>).</a:t>
+            </a:r>
+          </a:p>
+          <a:p>
+            <a:r>
+              <a:rPr lang="it-CH" dirty="0" err="1"/>
+              <a:t>Enter</a:t>
+            </a:r>
+            <a:r>
+              <a:rPr lang="it-CH" dirty="0"/>
+              <a:t> the file name </a:t>
+            </a:r>
+            <a:r>
+              <a:rPr lang="it-CH" dirty="0" err="1"/>
+              <a:t>without</a:t>
+            </a:r>
+            <a:r>
+              <a:rPr lang="it-CH" dirty="0"/>
+              <a:t> extension (.gif </a:t>
+            </a:r>
+            <a:r>
+              <a:rPr lang="it-CH" dirty="0" err="1"/>
+              <a:t>will</a:t>
+            </a:r>
+            <a:r>
+              <a:rPr lang="it-CH" dirty="0"/>
+              <a:t> be </a:t>
+            </a:r>
+            <a:r>
+              <a:rPr lang="it-CH" dirty="0" err="1"/>
+              <a:t>automatically</a:t>
+            </a:r>
+            <a:r>
+              <a:rPr lang="it-CH" dirty="0"/>
+              <a:t> </a:t>
+            </a:r>
+            <a:r>
+              <a:rPr lang="it-CH" dirty="0" err="1"/>
+              <a:t>generated</a:t>
+            </a:r>
+            <a:r>
+              <a:rPr lang="it-CH" dirty="0"/>
+              <a:t>). The file </a:t>
+            </a:r>
+            <a:r>
+              <a:rPr lang="it-CH" dirty="0" err="1"/>
+              <a:t>is</a:t>
+            </a:r>
+            <a:r>
+              <a:rPr lang="it-CH" dirty="0"/>
+              <a:t> </a:t>
+            </a:r>
+            <a:r>
+              <a:rPr lang="it-CH" dirty="0" err="1"/>
+              <a:t>now</a:t>
+            </a:r>
+            <a:r>
+              <a:rPr lang="it-CH" dirty="0"/>
+              <a:t> </a:t>
+            </a:r>
+            <a:r>
+              <a:rPr lang="it-CH" dirty="0" err="1"/>
+              <a:t>saved</a:t>
+            </a:r>
+            <a:r>
+              <a:rPr lang="it-CH" dirty="0"/>
+              <a:t> in the «</a:t>
+            </a:r>
+            <a:r>
+              <a:rPr lang="it-CH" dirty="0" err="1"/>
+              <a:t>GIFs</a:t>
+            </a:r>
+            <a:r>
+              <a:rPr lang="it-CH" dirty="0"/>
+              <a:t>» folder.</a:t>
+            </a:r>
+          </a:p>
+        </p:txBody>
+      </p:sp>
+      <p:pic>
+        <p:nvPicPr>
+          <p:cNvPr id="5" name="Picture 4" descr="A screenshot of a computer&#10;&#10;Description automatically generated with medium confidence">
+            <a:extLst>
+              <a:ext uri="{FF2B5EF4-FFF2-40B4-BE49-F238E27FC236}">
+                <a16:creationId xmlns:a16="http://schemas.microsoft.com/office/drawing/2014/main" id="{55C6FE3A-0C5F-BD44-93A6-DB5856E2F36D}"/>
+              </a:ext>
+            </a:extLst>
+          </p:cNvPr>
+          <p:cNvPicPr>
+            <a:picLocks noChangeAspect="1"/>
+          </p:cNvPicPr>
+          <p:nvPr/>
+        </p:nvPicPr>
+        <p:blipFill rotWithShape="1">
+          <a:blip r:embed="rId2">
+            <a:extLst>
+              <a:ext uri="{28A0092B-C50C-407E-A947-70E740481C1C}">
+                <a14:useLocalDpi xmlns:a14="http://schemas.microsoft.com/office/drawing/2010/main" val="0"/>
+              </a:ext>
+            </a:extLst>
+          </a:blip>
+          <a:srcRect t="3647" r="39858" b="59749"/>
+          <a:stretch/>
+        </p:blipFill>
+        <p:spPr>
+          <a:xfrm>
+            <a:off x="2605177" y="4102688"/>
+            <a:ext cx="6981646" cy="2390187"/>
+          </a:xfrm>
+          <a:prstGeom prst="rect">
+            <a:avLst/>
+          </a:prstGeom>
+        </p:spPr>
+      </p:pic>
+    </p:spTree>
+    <p:extLst>
+      <p:ext uri="{BB962C8B-B14F-4D97-AF65-F5344CB8AC3E}">
+        <p14:creationId xmlns:p14="http://schemas.microsoft.com/office/powerpoint/2010/main" val="3939354120"/>
+      </p:ext>
+    </p:extLst>
+  </p:cSld>
+  <p:clrMapOvr>
+    <a:masterClrMapping/>
+  </p:clrMapOvr>
+</p:sld>
+</file>
+
+<file path=ppt/slides/slide14.xml><?xml version="1.0" encoding="utf-8"?>
+<p:sld xmlns:a="http://schemas.openxmlformats.org/drawingml/2006/main" xmlns:r="http://schemas.openxmlformats.org/officeDocument/2006/relationships" xmlns:p="http://schemas.openxmlformats.org/presentationml/2006/main">
+  <p:cSld>
+    <p:spTree>
+      <p:nvGrpSpPr>
+        <p:cNvPr id="1" name=""/>
+        <p:cNvGrpSpPr/>
+        <p:nvPr/>
+      </p:nvGrpSpPr>
+      <p:grpSpPr>
+        <a:xfrm>
+          <a:off x="0" y="0"/>
+          <a:ext cx="0" cy="0"/>
+          <a:chOff x="0" y="0"/>
+          <a:chExt cx="0" cy="0"/>
+        </a:xfrm>
+      </p:grpSpPr>
+      <p:sp>
+        <p:nvSpPr>
+          <p:cNvPr id="4" name="Title 3">
+            <a:extLst>
+              <a:ext uri="{FF2B5EF4-FFF2-40B4-BE49-F238E27FC236}">
+                <a16:creationId xmlns:a16="http://schemas.microsoft.com/office/drawing/2014/main" id="{EA9B64C0-1340-A884-3044-2FFFCAAE644C}"/>
+              </a:ext>
+            </a:extLst>
+          </p:cNvPr>
+          <p:cNvSpPr>
+            <a:spLocks noGrp="1"/>
+          </p:cNvSpPr>
+          <p:nvPr>
+            <p:ph type="title"/>
+          </p:nvPr>
+        </p:nvSpPr>
+        <p:spPr/>
+        <p:txBody>
+          <a:bodyPr/>
+          <a:lstStyle/>
+          <a:p>
+            <a:r>
+              <a:rPr lang="it-CH" dirty="0"/>
+              <a:t>Save Images</a:t>
+            </a:r>
+          </a:p>
+        </p:txBody>
+      </p:sp>
+      <p:sp>
+        <p:nvSpPr>
+          <p:cNvPr id="5" name="Text Placeholder 4">
+            <a:extLst>
+              <a:ext uri="{FF2B5EF4-FFF2-40B4-BE49-F238E27FC236}">
+                <a16:creationId xmlns:a16="http://schemas.microsoft.com/office/drawing/2014/main" id="{1978CFC8-578A-471F-F3DA-27D09054C13C}"/>
+              </a:ext>
+            </a:extLst>
+          </p:cNvPr>
+          <p:cNvSpPr>
+            <a:spLocks noGrp="1"/>
+          </p:cNvSpPr>
+          <p:nvPr>
+            <p:ph type="body" idx="1"/>
+          </p:nvPr>
+        </p:nvSpPr>
+        <p:spPr/>
+        <p:txBody>
+          <a:bodyPr/>
+          <a:lstStyle/>
+          <a:p>
+            <a:r>
+              <a:rPr lang="it-CH" dirty="0"/>
+              <a:t>From </a:t>
+            </a:r>
+            <a:r>
+              <a:rPr lang="it-CH" dirty="0" err="1"/>
+              <a:t>Thermero</a:t>
+            </a:r>
+            <a:r>
+              <a:rPr lang="it-CH" dirty="0"/>
+              <a:t> and IR camera Data</a:t>
+            </a:r>
+          </a:p>
+        </p:txBody>
+      </p:sp>
+    </p:spTree>
+    <p:extLst>
+      <p:ext uri="{BB962C8B-B14F-4D97-AF65-F5344CB8AC3E}">
+        <p14:creationId xmlns:p14="http://schemas.microsoft.com/office/powerpoint/2010/main" val="3964131981"/>
+      </p:ext>
+    </p:extLst>
+  </p:cSld>
+  <p:clrMapOvr>
+    <a:masterClrMapping/>
+  </p:clrMapOvr>
+</p:sld>
+</file>
+
+<file path=ppt/slides/slide15.xml><?xml version="1.0" encoding="utf-8"?>
+<p:sld xmlns:a="http://schemas.openxmlformats.org/drawingml/2006/main" xmlns:r="http://schemas.openxmlformats.org/officeDocument/2006/relationships" xmlns:p="http://schemas.openxmlformats.org/presentationml/2006/main">
+  <p:cSld>
+    <p:spTree>
+      <p:nvGrpSpPr>
+        <p:cNvPr id="1" name=""/>
+        <p:cNvGrpSpPr/>
+        <p:nvPr/>
+      </p:nvGrpSpPr>
+      <p:grpSpPr>
+        <a:xfrm>
+          <a:off x="0" y="0"/>
+          <a:ext cx="0" cy="0"/>
+          <a:chOff x="0" y="0"/>
+          <a:chExt cx="0" cy="0"/>
+        </a:xfrm>
+      </p:grpSpPr>
+      <p:sp>
+        <p:nvSpPr>
+          <p:cNvPr id="2" name="Title 1">
+            <a:extLst>
+              <a:ext uri="{FF2B5EF4-FFF2-40B4-BE49-F238E27FC236}">
+                <a16:creationId xmlns:a16="http://schemas.microsoft.com/office/drawing/2014/main" id="{614625EF-EB1D-88AD-EFA0-8B5C7E4D3EF9}"/>
+              </a:ext>
+            </a:extLst>
+          </p:cNvPr>
+          <p:cNvSpPr>
+            <a:spLocks noGrp="1"/>
+          </p:cNvSpPr>
+          <p:nvPr>
+            <p:ph type="title"/>
+          </p:nvPr>
+        </p:nvSpPr>
+        <p:spPr/>
+        <p:txBody>
+          <a:bodyPr/>
+          <a:lstStyle/>
+          <a:p>
+            <a:r>
+              <a:rPr lang="it-CH" dirty="0"/>
+              <a:t>Save Image</a:t>
+            </a:r>
+          </a:p>
+        </p:txBody>
+      </p:sp>
+      <p:sp>
+        <p:nvSpPr>
+          <p:cNvPr id="3" name="Content Placeholder 2">
+            <a:extLst>
+              <a:ext uri="{FF2B5EF4-FFF2-40B4-BE49-F238E27FC236}">
+                <a16:creationId xmlns:a16="http://schemas.microsoft.com/office/drawing/2014/main" id="{EE1B07E6-6E89-34EE-9984-4C067925AC1D}"/>
+              </a:ext>
+            </a:extLst>
+          </p:cNvPr>
+          <p:cNvSpPr>
+            <a:spLocks noGrp="1"/>
+          </p:cNvSpPr>
+          <p:nvPr>
+            <p:ph idx="1"/>
+          </p:nvPr>
+        </p:nvSpPr>
+        <p:spPr/>
+        <p:txBody>
+          <a:bodyPr/>
+          <a:lstStyle/>
+          <a:p>
+            <a:pPr marL="0" indent="0">
+              <a:buNone/>
+            </a:pPr>
+            <a:r>
+              <a:rPr lang="it-CH" dirty="0"/>
+              <a:t>After the data csv files are </a:t>
+            </a:r>
+            <a:r>
+              <a:rPr lang="it-CH" dirty="0" err="1"/>
+              <a:t>saved</a:t>
+            </a:r>
+            <a:r>
+              <a:rPr lang="it-CH" dirty="0"/>
+              <a:t> </a:t>
+            </a:r>
+            <a:r>
+              <a:rPr lang="it-CH" dirty="0" err="1"/>
+              <a:t>into</a:t>
+            </a:r>
+            <a:r>
+              <a:rPr lang="it-CH" dirty="0"/>
+              <a:t> the «Data» folder, you can follow </a:t>
+            </a:r>
+            <a:r>
+              <a:rPr lang="it-CH" dirty="0" err="1"/>
+              <a:t>these</a:t>
+            </a:r>
+            <a:r>
+              <a:rPr lang="it-CH" dirty="0"/>
+              <a:t> steps to create an Image:</a:t>
+            </a:r>
+          </a:p>
+          <a:p>
+            <a:pPr marL="514350" indent="-514350">
+              <a:buFont typeface="+mj-lt"/>
+              <a:buAutoNum type="arabicPeriod"/>
+            </a:pPr>
+            <a:r>
+              <a:rPr lang="it-CH" dirty="0"/>
+              <a:t>Open «</a:t>
+            </a:r>
+            <a:r>
+              <a:rPr lang="it-CH" dirty="0" err="1"/>
+              <a:t>Generators</a:t>
+            </a:r>
+            <a:r>
+              <a:rPr lang="it-CH" dirty="0"/>
+              <a:t>» folder.</a:t>
+            </a:r>
+          </a:p>
+          <a:p>
+            <a:pPr marL="514350" indent="-514350">
+              <a:buFont typeface="+mj-lt"/>
+              <a:buAutoNum type="arabicPeriod"/>
+            </a:pPr>
+            <a:r>
+              <a:rPr lang="it-CH" dirty="0"/>
+              <a:t>Open «csv2png.py».</a:t>
+            </a:r>
+          </a:p>
+          <a:p>
+            <a:pPr marL="514350" indent="-514350">
+              <a:buFont typeface="+mj-lt"/>
+              <a:buAutoNum type="arabicPeriod"/>
+            </a:pPr>
+            <a:r>
+              <a:rPr lang="it-CH" dirty="0" err="1"/>
+              <a:t>Run</a:t>
+            </a:r>
+            <a:r>
+              <a:rPr lang="it-CH" dirty="0"/>
+              <a:t> the code.</a:t>
+            </a:r>
+          </a:p>
+          <a:p>
+            <a:r>
+              <a:rPr lang="it-CH" dirty="0"/>
+              <a:t>Select the data file of </a:t>
+            </a:r>
+            <a:r>
+              <a:rPr lang="it-CH" dirty="0" err="1"/>
+              <a:t>interest</a:t>
+            </a:r>
+            <a:r>
+              <a:rPr lang="it-CH" dirty="0"/>
+              <a:t> by </a:t>
+            </a:r>
+            <a:r>
+              <a:rPr lang="it-CH" dirty="0" err="1"/>
+              <a:t>navigating</a:t>
+            </a:r>
+            <a:r>
+              <a:rPr lang="it-CH" dirty="0"/>
+              <a:t> the pop-up window. NB: The data are </a:t>
+            </a:r>
+            <a:r>
+              <a:rPr lang="it-CH" dirty="0" err="1"/>
+              <a:t>saved</a:t>
+            </a:r>
+            <a:r>
+              <a:rPr lang="it-CH" dirty="0"/>
+              <a:t> in the «Data» folder.</a:t>
+            </a:r>
+          </a:p>
+          <a:p>
+            <a:pPr marL="0" indent="0">
+              <a:buNone/>
+            </a:pPr>
+            <a:endParaRPr lang="it-CH" dirty="0"/>
+          </a:p>
+          <a:p>
+            <a:pPr marL="0" indent="0">
+              <a:buNone/>
+            </a:pPr>
+            <a:r>
+              <a:rPr lang="it-CH" dirty="0" err="1"/>
+              <a:t>Change</a:t>
+            </a:r>
+            <a:r>
+              <a:rPr lang="it-CH" dirty="0"/>
+              <a:t> Slide %</a:t>
+            </a:r>
+          </a:p>
+        </p:txBody>
+      </p:sp>
+    </p:spTree>
+    <p:extLst>
+      <p:ext uri="{BB962C8B-B14F-4D97-AF65-F5344CB8AC3E}">
+        <p14:creationId xmlns:p14="http://schemas.microsoft.com/office/powerpoint/2010/main" val="2784332678"/>
+      </p:ext>
+    </p:extLst>
+  </p:cSld>
+  <p:clrMapOvr>
+    <a:masterClrMapping/>
+  </p:clrMapOvr>
+</p:sld>
+</file>
+
+<file path=ppt/slides/slide16.xml><?xml version="1.0" encoding="utf-8"?>
+<p:sld xmlns:a="http://schemas.openxmlformats.org/drawingml/2006/main" xmlns:r="http://schemas.openxmlformats.org/officeDocument/2006/relationships" xmlns:p="http://schemas.openxmlformats.org/presentationml/2006/main">
+  <p:cSld>
+    <p:spTree>
+      <p:nvGrpSpPr>
+        <p:cNvPr id="1" name=""/>
+        <p:cNvGrpSpPr/>
+        <p:nvPr/>
+      </p:nvGrpSpPr>
+      <p:grpSpPr>
+        <a:xfrm>
+          <a:off x="0" y="0"/>
+          <a:ext cx="0" cy="0"/>
+          <a:chOff x="0" y="0"/>
+          <a:chExt cx="0" cy="0"/>
+        </a:xfrm>
+      </p:grpSpPr>
+      <p:sp>
+        <p:nvSpPr>
+          <p:cNvPr id="2" name="Title 1">
+            <a:extLst>
+              <a:ext uri="{FF2B5EF4-FFF2-40B4-BE49-F238E27FC236}">
+                <a16:creationId xmlns:a16="http://schemas.microsoft.com/office/drawing/2014/main" id="{614625EF-EB1D-88AD-EFA0-8B5C7E4D3EF9}"/>
+              </a:ext>
+            </a:extLst>
+          </p:cNvPr>
+          <p:cNvSpPr>
+            <a:spLocks noGrp="1"/>
+          </p:cNvSpPr>
+          <p:nvPr>
+            <p:ph type="title"/>
+          </p:nvPr>
+        </p:nvSpPr>
+        <p:spPr/>
+        <p:txBody>
+          <a:bodyPr/>
+          <a:lstStyle/>
+          <a:p>
+            <a:r>
+              <a:rPr lang="it-CH" dirty="0"/>
+              <a:t>Save Image</a:t>
+            </a:r>
+          </a:p>
+        </p:txBody>
+      </p:sp>
+      <p:sp>
+        <p:nvSpPr>
+          <p:cNvPr id="3" name="Content Placeholder 2">
+            <a:extLst>
+              <a:ext uri="{FF2B5EF4-FFF2-40B4-BE49-F238E27FC236}">
+                <a16:creationId xmlns:a16="http://schemas.microsoft.com/office/drawing/2014/main" id="{EE1B07E6-6E89-34EE-9984-4C067925AC1D}"/>
+              </a:ext>
+            </a:extLst>
+          </p:cNvPr>
+          <p:cNvSpPr>
+            <a:spLocks noGrp="1"/>
+          </p:cNvSpPr>
+          <p:nvPr>
+            <p:ph idx="1"/>
+          </p:nvPr>
+        </p:nvSpPr>
+        <p:spPr/>
+        <p:txBody>
+          <a:bodyPr/>
+          <a:lstStyle/>
+          <a:p>
+            <a:r>
+              <a:rPr lang="it-CH" dirty="0" err="1"/>
+              <a:t>Enter</a:t>
+            </a:r>
+            <a:r>
+              <a:rPr lang="it-CH" dirty="0"/>
+              <a:t> the time of the image. To </a:t>
+            </a:r>
+            <a:r>
+              <a:rPr lang="it-CH" dirty="0" err="1"/>
+              <a:t>simplify</a:t>
+            </a:r>
+            <a:r>
+              <a:rPr lang="it-CH" dirty="0"/>
+              <a:t> </a:t>
+            </a:r>
+            <a:r>
+              <a:rPr lang="it-CH" dirty="0" err="1"/>
+              <a:t>this</a:t>
+            </a:r>
+            <a:r>
+              <a:rPr lang="it-CH" dirty="0"/>
+              <a:t> procedure, you can open the data file of </a:t>
+            </a:r>
+            <a:r>
+              <a:rPr lang="it-CH" dirty="0" err="1"/>
+              <a:t>interest</a:t>
+            </a:r>
+            <a:r>
+              <a:rPr lang="it-CH" dirty="0"/>
+              <a:t> with </a:t>
+            </a:r>
+            <a:r>
+              <a:rPr lang="it-CH" dirty="0" err="1"/>
+              <a:t>Gnumeric</a:t>
+            </a:r>
+            <a:r>
+              <a:rPr lang="it-CH" dirty="0"/>
+              <a:t> and copy and paste the </a:t>
+            </a:r>
+            <a:r>
+              <a:rPr lang="it-CH" dirty="0" err="1"/>
+              <a:t>value</a:t>
+            </a:r>
+            <a:r>
+              <a:rPr lang="it-CH" dirty="0"/>
+              <a:t> of the «Time» </a:t>
+            </a:r>
+            <a:r>
+              <a:rPr lang="it-CH" dirty="0" err="1"/>
+              <a:t>column</a:t>
+            </a:r>
+            <a:r>
+              <a:rPr lang="it-CH" dirty="0"/>
+              <a:t> (the first one on the </a:t>
+            </a:r>
+            <a:r>
+              <a:rPr lang="it-CH" dirty="0" err="1"/>
+              <a:t>left</a:t>
+            </a:r>
+            <a:r>
+              <a:rPr lang="it-CH" dirty="0"/>
+              <a:t>).</a:t>
+            </a:r>
+          </a:p>
+          <a:p>
+            <a:r>
+              <a:rPr lang="it-CH" dirty="0" err="1"/>
+              <a:t>Enter</a:t>
+            </a:r>
+            <a:r>
+              <a:rPr lang="it-CH" dirty="0"/>
+              <a:t> the file name </a:t>
+            </a:r>
+            <a:r>
+              <a:rPr lang="it-CH" dirty="0" err="1"/>
+              <a:t>without</a:t>
+            </a:r>
+            <a:r>
+              <a:rPr lang="it-CH" dirty="0"/>
+              <a:t> extension (.png </a:t>
+            </a:r>
+            <a:r>
+              <a:rPr lang="it-CH" dirty="0" err="1"/>
+              <a:t>will</a:t>
+            </a:r>
+            <a:r>
+              <a:rPr lang="it-CH" dirty="0"/>
+              <a:t> be </a:t>
+            </a:r>
+            <a:r>
+              <a:rPr lang="it-CH" dirty="0" err="1"/>
+              <a:t>automatically</a:t>
+            </a:r>
+            <a:r>
+              <a:rPr lang="it-CH" dirty="0"/>
+              <a:t> </a:t>
+            </a:r>
+            <a:r>
+              <a:rPr lang="it-CH" dirty="0" err="1"/>
+              <a:t>generated</a:t>
+            </a:r>
+            <a:r>
+              <a:rPr lang="it-CH" dirty="0"/>
+              <a:t>). The file </a:t>
+            </a:r>
+            <a:r>
+              <a:rPr lang="it-CH" dirty="0" err="1"/>
+              <a:t>is</a:t>
+            </a:r>
+            <a:r>
+              <a:rPr lang="it-CH" dirty="0"/>
+              <a:t> </a:t>
+            </a:r>
+            <a:r>
+              <a:rPr lang="it-CH" dirty="0" err="1"/>
+              <a:t>now</a:t>
+            </a:r>
+            <a:r>
+              <a:rPr lang="it-CH" dirty="0"/>
+              <a:t> </a:t>
+            </a:r>
+            <a:r>
+              <a:rPr lang="it-CH" dirty="0" err="1"/>
+              <a:t>saved</a:t>
+            </a:r>
+            <a:r>
+              <a:rPr lang="it-CH" dirty="0"/>
+              <a:t> in the «Images» folder.</a:t>
+            </a:r>
+          </a:p>
+        </p:txBody>
+      </p:sp>
+      <p:pic>
+        <p:nvPicPr>
+          <p:cNvPr id="5" name="Picture 4" descr="A screenshot of a computer&#10;&#10;Description automatically generated with medium confidence">
+            <a:extLst>
+              <a:ext uri="{FF2B5EF4-FFF2-40B4-BE49-F238E27FC236}">
+                <a16:creationId xmlns:a16="http://schemas.microsoft.com/office/drawing/2014/main" id="{55C6FE3A-0C5F-BD44-93A6-DB5856E2F36D}"/>
+              </a:ext>
+            </a:extLst>
+          </p:cNvPr>
+          <p:cNvPicPr>
+            <a:picLocks noChangeAspect="1"/>
+          </p:cNvPicPr>
+          <p:nvPr/>
+        </p:nvPicPr>
+        <p:blipFill rotWithShape="1">
+          <a:blip r:embed="rId2">
+            <a:extLst>
+              <a:ext uri="{28A0092B-C50C-407E-A947-70E740481C1C}">
+                <a14:useLocalDpi xmlns:a14="http://schemas.microsoft.com/office/drawing/2010/main" val="0"/>
+              </a:ext>
+            </a:extLst>
+          </a:blip>
+          <a:srcRect t="3647" r="39858" b="59749"/>
+          <a:stretch/>
+        </p:blipFill>
+        <p:spPr>
+          <a:xfrm>
+            <a:off x="2605177" y="4102688"/>
+            <a:ext cx="6981646" cy="2390187"/>
+          </a:xfrm>
+          <a:prstGeom prst="rect">
+            <a:avLst/>
+          </a:prstGeom>
+        </p:spPr>
+      </p:pic>
+    </p:spTree>
+    <p:extLst>
+      <p:ext uri="{BB962C8B-B14F-4D97-AF65-F5344CB8AC3E}">
+        <p14:creationId xmlns:p14="http://schemas.microsoft.com/office/powerpoint/2010/main" val="1002499736"/>
+      </p:ext>
+    </p:extLst>
+  </p:cSld>
+  <p:clrMapOvr>
+    <a:masterClrMapping/>
+  </p:clrMapOvr>
+</p:sld>
+</file>
+
+<file path=ppt/slides/slide2.xml><?xml version="1.0" encoding="utf-8"?>
+<p:sld xmlns:a="http://schemas.openxmlformats.org/drawingml/2006/main" xmlns:r="http://schemas.openxmlformats.org/officeDocument/2006/relationships" xmlns:p="http://schemas.openxmlformats.org/presentationml/2006/main">
+  <p:cSld>
+    <p:spTree>
+      <p:nvGrpSpPr>
+        <p:cNvPr id="1" name=""/>
+        <p:cNvGrpSpPr/>
+        <p:nvPr/>
+      </p:nvGrpSpPr>
+      <p:grpSpPr>
+        <a:xfrm>
+          <a:off x="0" y="0"/>
+          <a:ext cx="0" cy="0"/>
+          <a:chOff x="0" y="0"/>
+          <a:chExt cx="0" cy="0"/>
+        </a:xfrm>
+      </p:grpSpPr>
+      <p:sp>
+        <p:nvSpPr>
+          <p:cNvPr id="4" name="Title 3">
+            <a:extLst>
+              <a:ext uri="{FF2B5EF4-FFF2-40B4-BE49-F238E27FC236}">
+                <a16:creationId xmlns:a16="http://schemas.microsoft.com/office/drawing/2014/main" id="{EA9B64C0-1340-A884-3044-2FFFCAAE644C}"/>
+              </a:ext>
+            </a:extLst>
+          </p:cNvPr>
+          <p:cNvSpPr>
+            <a:spLocks noGrp="1"/>
+          </p:cNvSpPr>
+          <p:nvPr>
+            <p:ph type="title"/>
+          </p:nvPr>
+        </p:nvSpPr>
+        <p:spPr/>
+        <p:txBody>
+          <a:bodyPr/>
+          <a:lstStyle/>
+          <a:p>
+            <a:r>
+              <a:rPr lang="it-CH" dirty="0"/>
+              <a:t>Folder </a:t>
+            </a:r>
+            <a:r>
+              <a:rPr lang="it-CH" dirty="0" err="1"/>
+              <a:t>Structure</a:t>
+            </a:r>
+            <a:endParaRPr lang="it-CH" dirty="0"/>
+          </a:p>
+        </p:txBody>
+      </p:sp>
+      <p:sp>
+        <p:nvSpPr>
+          <p:cNvPr id="5" name="Text Placeholder 4">
+            <a:extLst>
+              <a:ext uri="{FF2B5EF4-FFF2-40B4-BE49-F238E27FC236}">
+                <a16:creationId xmlns:a16="http://schemas.microsoft.com/office/drawing/2014/main" id="{1978CFC8-578A-471F-F3DA-27D09054C13C}"/>
+              </a:ext>
+            </a:extLst>
+          </p:cNvPr>
+          <p:cNvSpPr>
+            <a:spLocks noGrp="1"/>
+          </p:cNvSpPr>
+          <p:nvPr>
+            <p:ph type="body" idx="1"/>
+          </p:nvPr>
+        </p:nvSpPr>
+        <p:spPr/>
+        <p:txBody>
+          <a:bodyPr/>
+          <a:lstStyle/>
+          <a:p>
+            <a:endParaRPr lang="it-CH"/>
+          </a:p>
+        </p:txBody>
+      </p:sp>
+    </p:spTree>
+    <p:extLst>
+      <p:ext uri="{BB962C8B-B14F-4D97-AF65-F5344CB8AC3E}">
+        <p14:creationId xmlns:p14="http://schemas.microsoft.com/office/powerpoint/2010/main" val="1895069197"/>
+      </p:ext>
+    </p:extLst>
+  </p:cSld>
+  <p:clrMapOvr>
+    <a:masterClrMapping/>
+  </p:clrMapOvr>
+</p:sld>
+</file>
+
+<file path=ppt/slides/slide3.xml><?xml version="1.0" encoding="utf-8"?>
+<p:sld xmlns:a="http://schemas.openxmlformats.org/drawingml/2006/main" xmlns:r="http://schemas.openxmlformats.org/officeDocument/2006/relationships" xmlns:p="http://schemas.openxmlformats.org/presentationml/2006/main">
+  <p:cSld>
+    <p:spTree>
+      <p:nvGrpSpPr>
+        <p:cNvPr id="1" name=""/>
+        <p:cNvGrpSpPr/>
+        <p:nvPr/>
+      </p:nvGrpSpPr>
+      <p:grpSpPr>
+        <a:xfrm>
+          <a:off x="0" y="0"/>
+          <a:ext cx="0" cy="0"/>
+          <a:chOff x="0" y="0"/>
+          <a:chExt cx="0" cy="0"/>
+        </a:xfrm>
+      </p:grpSpPr>
+      <p:sp>
+        <p:nvSpPr>
+          <p:cNvPr id="2" name="Title 1">
+            <a:extLst>
+              <a:ext uri="{FF2B5EF4-FFF2-40B4-BE49-F238E27FC236}">
+                <a16:creationId xmlns:a16="http://schemas.microsoft.com/office/drawing/2014/main" id="{1612BADE-0E87-A308-711C-0173021728ED}"/>
+              </a:ext>
+            </a:extLst>
+          </p:cNvPr>
+          <p:cNvSpPr>
+            <a:spLocks noGrp="1"/>
+          </p:cNvSpPr>
+          <p:nvPr>
+            <p:ph type="title"/>
+          </p:nvPr>
+        </p:nvSpPr>
+        <p:spPr/>
+        <p:txBody>
+          <a:bodyPr/>
+          <a:lstStyle/>
+          <a:p>
+            <a:r>
+              <a:rPr lang="it-CH" dirty="0"/>
+              <a:t>Folders</a:t>
+            </a:r>
+          </a:p>
+        </p:txBody>
+      </p:sp>
+      <p:sp>
+        <p:nvSpPr>
+          <p:cNvPr id="3" name="Content Placeholder 2">
+            <a:extLst>
+              <a:ext uri="{FF2B5EF4-FFF2-40B4-BE49-F238E27FC236}">
+                <a16:creationId xmlns:a16="http://schemas.microsoft.com/office/drawing/2014/main" id="{CCC1A4EC-18F5-EFE1-BC43-906197BF1014}"/>
+              </a:ext>
+            </a:extLst>
+          </p:cNvPr>
+          <p:cNvSpPr>
+            <a:spLocks noGrp="1"/>
+          </p:cNvSpPr>
+          <p:nvPr>
+            <p:ph idx="1"/>
+          </p:nvPr>
+        </p:nvSpPr>
+        <p:spPr/>
+        <p:txBody>
+          <a:bodyPr>
+            <a:normAutofit fontScale="92500" lnSpcReduction="10000"/>
+          </a:bodyPr>
+          <a:lstStyle/>
+          <a:p>
+            <a:r>
+              <a:rPr lang="it-CH" b="1" dirty="0" err="1"/>
+              <a:t>Calibrations</a:t>
+            </a:r>
+            <a:r>
+              <a:rPr lang="it-CH" dirty="0"/>
+              <a:t>: </a:t>
+            </a:r>
+            <a:r>
+              <a:rPr lang="it-CH" dirty="0" err="1"/>
+              <a:t>Contains</a:t>
+            </a:r>
+            <a:r>
+              <a:rPr lang="it-CH" dirty="0"/>
+              <a:t> the </a:t>
+            </a:r>
+            <a:r>
+              <a:rPr lang="it-CH" dirty="0" err="1"/>
+              <a:t>codes</a:t>
+            </a:r>
+            <a:r>
+              <a:rPr lang="it-CH" dirty="0"/>
+              <a:t> to calibrate the </a:t>
+            </a:r>
+            <a:r>
+              <a:rPr lang="it-CH" dirty="0" err="1"/>
+              <a:t>sensors</a:t>
+            </a:r>
+            <a:r>
+              <a:rPr lang="it-CH" dirty="0"/>
+              <a:t> </a:t>
+            </a:r>
+            <a:r>
+              <a:rPr lang="it-CH" dirty="0" err="1"/>
+              <a:t>that</a:t>
+            </a:r>
+            <a:r>
+              <a:rPr lang="it-CH" dirty="0"/>
+              <a:t> </a:t>
+            </a:r>
+            <a:r>
+              <a:rPr lang="it-CH" dirty="0" err="1"/>
+              <a:t>need</a:t>
+            </a:r>
+            <a:r>
+              <a:rPr lang="it-CH" dirty="0"/>
+              <a:t> </a:t>
+            </a:r>
+            <a:r>
+              <a:rPr lang="it-CH" dirty="0" err="1"/>
+              <a:t>it</a:t>
+            </a:r>
+            <a:r>
+              <a:rPr lang="it-CH" dirty="0"/>
+              <a:t>. </a:t>
+            </a:r>
+            <a:r>
+              <a:rPr lang="it-CH" dirty="0" err="1"/>
+              <a:t>Example</a:t>
+            </a:r>
+            <a:r>
+              <a:rPr lang="it-CH" dirty="0"/>
+              <a:t>: The IR camera </a:t>
+            </a:r>
+            <a:r>
+              <a:rPr lang="it-CH" dirty="0" err="1"/>
+              <a:t>needs</a:t>
+            </a:r>
+            <a:r>
+              <a:rPr lang="it-CH" dirty="0"/>
+              <a:t> to be </a:t>
+            </a:r>
+            <a:r>
+              <a:rPr lang="it-CH" dirty="0" err="1"/>
+              <a:t>positioned</a:t>
+            </a:r>
+            <a:r>
+              <a:rPr lang="it-CH" dirty="0"/>
+              <a:t> </a:t>
+            </a:r>
+            <a:r>
+              <a:rPr lang="it-CH" dirty="0" err="1"/>
+              <a:t>at</a:t>
+            </a:r>
+            <a:r>
+              <a:rPr lang="it-CH" dirty="0"/>
+              <a:t> the </a:t>
+            </a:r>
+            <a:r>
+              <a:rPr lang="it-CH" dirty="0" err="1"/>
+              <a:t>right</a:t>
+            </a:r>
+            <a:r>
+              <a:rPr lang="it-CH" dirty="0"/>
+              <a:t> </a:t>
+            </a:r>
+            <a:r>
+              <a:rPr lang="it-CH" dirty="0" err="1"/>
+              <a:t>height</a:t>
+            </a:r>
+            <a:r>
+              <a:rPr lang="it-CH" dirty="0"/>
+              <a:t>.</a:t>
+            </a:r>
+          </a:p>
+          <a:p>
+            <a:r>
+              <a:rPr lang="it-CH" b="1" dirty="0"/>
+              <a:t>Data</a:t>
+            </a:r>
+            <a:r>
+              <a:rPr lang="it-CH" dirty="0"/>
+              <a:t>: At </a:t>
+            </a:r>
+            <a:r>
+              <a:rPr lang="it-CH" dirty="0" err="1"/>
+              <a:t>every</a:t>
+            </a:r>
+            <a:r>
+              <a:rPr lang="it-CH" dirty="0"/>
+              <a:t> </a:t>
+            </a:r>
+            <a:r>
+              <a:rPr lang="it-CH" dirty="0" err="1"/>
+              <a:t>process</a:t>
+            </a:r>
+            <a:r>
+              <a:rPr lang="it-CH" dirty="0"/>
+              <a:t> stop, the </a:t>
+            </a:r>
+            <a:r>
+              <a:rPr lang="it-CH" dirty="0" err="1"/>
+              <a:t>sensor</a:t>
+            </a:r>
+            <a:r>
+              <a:rPr lang="it-CH" dirty="0"/>
+              <a:t> data are </a:t>
+            </a:r>
+            <a:r>
+              <a:rPr lang="it-CH" dirty="0" err="1"/>
+              <a:t>saved</a:t>
+            </a:r>
+            <a:r>
+              <a:rPr lang="it-CH" dirty="0"/>
+              <a:t> </a:t>
+            </a:r>
+            <a:r>
+              <a:rPr lang="it-CH" dirty="0" err="1"/>
+              <a:t>here</a:t>
+            </a:r>
+            <a:r>
+              <a:rPr lang="it-CH" dirty="0"/>
+              <a:t>.</a:t>
+            </a:r>
+          </a:p>
+          <a:p>
+            <a:r>
+              <a:rPr lang="it-CH" b="1" dirty="0" err="1"/>
+              <a:t>Documentation</a:t>
+            </a:r>
+            <a:r>
+              <a:rPr lang="it-CH" dirty="0"/>
+              <a:t>: </a:t>
+            </a:r>
+            <a:r>
+              <a:rPr lang="it-CH" dirty="0" err="1"/>
+              <a:t>Contains</a:t>
+            </a:r>
+            <a:r>
+              <a:rPr lang="it-CH" dirty="0"/>
+              <a:t> </a:t>
+            </a:r>
+            <a:r>
+              <a:rPr lang="it-CH" dirty="0" err="1"/>
+              <a:t>this</a:t>
+            </a:r>
+            <a:r>
+              <a:rPr lang="it-CH" dirty="0"/>
+              <a:t> </a:t>
+            </a:r>
+            <a:r>
+              <a:rPr lang="it-CH" dirty="0" err="1"/>
+              <a:t>manual</a:t>
+            </a:r>
+            <a:r>
+              <a:rPr lang="it-CH" dirty="0"/>
+              <a:t> and reports.</a:t>
+            </a:r>
+          </a:p>
+          <a:p>
+            <a:r>
+              <a:rPr lang="it-CH" b="1" dirty="0" err="1"/>
+              <a:t>Generators</a:t>
+            </a:r>
+            <a:r>
+              <a:rPr lang="it-CH" dirty="0"/>
+              <a:t>: </a:t>
+            </a:r>
+            <a:r>
+              <a:rPr lang="it-CH" dirty="0" err="1"/>
+              <a:t>Contains</a:t>
+            </a:r>
+            <a:r>
+              <a:rPr lang="it-CH" dirty="0"/>
+              <a:t> GIF and Image </a:t>
+            </a:r>
+            <a:r>
+              <a:rPr lang="it-CH" dirty="0" err="1"/>
+              <a:t>generators</a:t>
+            </a:r>
+            <a:r>
+              <a:rPr lang="it-CH" dirty="0"/>
+              <a:t> for </a:t>
+            </a:r>
+            <a:r>
+              <a:rPr lang="it-CH" dirty="0" err="1"/>
+              <a:t>both</a:t>
+            </a:r>
+            <a:r>
+              <a:rPr lang="it-CH" dirty="0"/>
+              <a:t> </a:t>
+            </a:r>
+            <a:r>
+              <a:rPr lang="it-CH" dirty="0" err="1"/>
+              <a:t>Thermero</a:t>
+            </a:r>
+            <a:r>
+              <a:rPr lang="it-CH" dirty="0"/>
+              <a:t> and IR data.</a:t>
+            </a:r>
+          </a:p>
+          <a:p>
+            <a:r>
+              <a:rPr lang="it-CH" b="1" dirty="0" err="1"/>
+              <a:t>GIFs</a:t>
+            </a:r>
+            <a:r>
+              <a:rPr lang="it-CH" dirty="0"/>
+              <a:t>: </a:t>
+            </a:r>
+            <a:r>
+              <a:rPr lang="it-CH" dirty="0" err="1"/>
+              <a:t>Contains</a:t>
+            </a:r>
+            <a:r>
+              <a:rPr lang="it-CH" dirty="0"/>
+              <a:t> the </a:t>
+            </a:r>
+            <a:r>
+              <a:rPr lang="it-CH" dirty="0" err="1"/>
+              <a:t>GIFs</a:t>
+            </a:r>
+            <a:r>
+              <a:rPr lang="it-CH" dirty="0"/>
+              <a:t> </a:t>
+            </a:r>
+            <a:r>
+              <a:rPr lang="it-CH" dirty="0" err="1"/>
+              <a:t>generated</a:t>
+            </a:r>
+            <a:r>
+              <a:rPr lang="it-CH" dirty="0"/>
+              <a:t>.</a:t>
+            </a:r>
+          </a:p>
+          <a:p>
+            <a:r>
+              <a:rPr lang="it-CH" b="1" dirty="0"/>
+              <a:t>Images</a:t>
+            </a:r>
+            <a:r>
+              <a:rPr lang="it-CH" dirty="0"/>
+              <a:t>: </a:t>
+            </a:r>
+            <a:r>
+              <a:rPr lang="it-CH" dirty="0" err="1"/>
+              <a:t>Contains</a:t>
+            </a:r>
+            <a:r>
+              <a:rPr lang="it-CH" dirty="0"/>
+              <a:t> the Images </a:t>
+            </a:r>
+            <a:r>
+              <a:rPr lang="it-CH" dirty="0" err="1"/>
+              <a:t>generated</a:t>
+            </a:r>
+            <a:r>
+              <a:rPr lang="it-CH" dirty="0"/>
+              <a:t>.</a:t>
+            </a:r>
+          </a:p>
+          <a:p>
+            <a:r>
+              <a:rPr lang="it-CH" b="1" dirty="0" err="1"/>
+              <a:t>Tests</a:t>
+            </a:r>
+            <a:r>
+              <a:rPr lang="it-CH" dirty="0"/>
+              <a:t>: </a:t>
+            </a:r>
+            <a:r>
+              <a:rPr lang="it-CH" dirty="0" err="1"/>
+              <a:t>Contains</a:t>
+            </a:r>
+            <a:r>
+              <a:rPr lang="it-CH" dirty="0"/>
+              <a:t> the </a:t>
+            </a:r>
+            <a:r>
+              <a:rPr lang="it-CH" dirty="0" err="1"/>
+              <a:t>codes</a:t>
+            </a:r>
+            <a:r>
+              <a:rPr lang="it-CH" dirty="0"/>
+              <a:t> to check the </a:t>
+            </a:r>
+            <a:r>
+              <a:rPr lang="it-CH" dirty="0" err="1"/>
+              <a:t>functioning</a:t>
+            </a:r>
+            <a:r>
+              <a:rPr lang="it-CH" dirty="0"/>
+              <a:t> of the single </a:t>
+            </a:r>
+            <a:r>
+              <a:rPr lang="it-CH" dirty="0" err="1"/>
+              <a:t>sensors</a:t>
+            </a:r>
+            <a:r>
+              <a:rPr lang="it-CH" dirty="0"/>
+              <a:t>, chips and </a:t>
+            </a:r>
+            <a:r>
+              <a:rPr lang="it-CH" dirty="0" err="1"/>
+              <a:t>actuators</a:t>
+            </a:r>
+            <a:r>
+              <a:rPr lang="it-CH" dirty="0"/>
+              <a:t>.</a:t>
+            </a:r>
+          </a:p>
+        </p:txBody>
+      </p:sp>
+    </p:spTree>
+    <p:extLst>
+      <p:ext uri="{BB962C8B-B14F-4D97-AF65-F5344CB8AC3E}">
+        <p14:creationId xmlns:p14="http://schemas.microsoft.com/office/powerpoint/2010/main" val="3131387425"/>
+      </p:ext>
+    </p:extLst>
+  </p:cSld>
+  <p:clrMapOvr>
+    <a:masterClrMapping/>
+  </p:clrMapOvr>
+</p:sld>
+</file>
+
+<file path=ppt/slides/slide4.xml><?xml version="1.0" encoding="utf-8"?>
+<p:sld xmlns:a="http://schemas.openxmlformats.org/drawingml/2006/main" xmlns:r="http://schemas.openxmlformats.org/officeDocument/2006/relationships" xmlns:p="http://schemas.openxmlformats.org/presentationml/2006/main">
+  <p:cSld>
+    <p:spTree>
+      <p:nvGrpSpPr>
+        <p:cNvPr id="1" name=""/>
+        <p:cNvGrpSpPr/>
+        <p:nvPr/>
+      </p:nvGrpSpPr>
+      <p:grpSpPr>
+        <a:xfrm>
+          <a:off x="0" y="0"/>
+          <a:ext cx="0" cy="0"/>
+          <a:chOff x="0" y="0"/>
+          <a:chExt cx="0" cy="0"/>
+        </a:xfrm>
+      </p:grpSpPr>
+      <p:sp>
+        <p:nvSpPr>
+          <p:cNvPr id="2" name="Title 1">
+            <a:extLst>
+              <a:ext uri="{FF2B5EF4-FFF2-40B4-BE49-F238E27FC236}">
+                <a16:creationId xmlns:a16="http://schemas.microsoft.com/office/drawing/2014/main" id="{F954FEC5-88F2-1575-8FF7-03F877B08078}"/>
+              </a:ext>
+            </a:extLst>
+          </p:cNvPr>
+          <p:cNvSpPr>
+            <a:spLocks noGrp="1"/>
+          </p:cNvSpPr>
+          <p:nvPr>
+            <p:ph type="title"/>
+          </p:nvPr>
+        </p:nvSpPr>
+        <p:spPr/>
+        <p:txBody>
+          <a:bodyPr/>
+          <a:lstStyle/>
+          <a:p>
+            <a:r>
+              <a:rPr lang="it-CH" dirty="0" err="1"/>
+              <a:t>Main</a:t>
+            </a:r>
+            <a:r>
+              <a:rPr lang="it-CH" dirty="0"/>
+              <a:t> and Classes</a:t>
+            </a:r>
+          </a:p>
+        </p:txBody>
+      </p:sp>
+      <p:sp>
+        <p:nvSpPr>
+          <p:cNvPr id="3" name="Content Placeholder 2">
+            <a:extLst>
+              <a:ext uri="{FF2B5EF4-FFF2-40B4-BE49-F238E27FC236}">
+                <a16:creationId xmlns:a16="http://schemas.microsoft.com/office/drawing/2014/main" id="{FDC38BB7-1A8E-F2FE-DC19-88FB27D81C3E}"/>
+              </a:ext>
+            </a:extLst>
+          </p:cNvPr>
+          <p:cNvSpPr>
+            <a:spLocks noGrp="1"/>
+          </p:cNvSpPr>
+          <p:nvPr>
+            <p:ph idx="1"/>
+          </p:nvPr>
+        </p:nvSpPr>
+        <p:spPr/>
+        <p:txBody>
+          <a:bodyPr>
+            <a:normAutofit lnSpcReduction="10000"/>
+          </a:bodyPr>
+          <a:lstStyle/>
+          <a:p>
+            <a:pPr marL="0" indent="0">
+              <a:buNone/>
+            </a:pPr>
+            <a:r>
+              <a:rPr lang="it-CH" dirty="0"/>
+              <a:t>Classes </a:t>
+            </a:r>
+            <a:r>
+              <a:rPr lang="it-CH" dirty="0" err="1"/>
+              <a:t>contain</a:t>
+            </a:r>
+            <a:r>
+              <a:rPr lang="it-CH" dirty="0"/>
+              <a:t> all the code to </a:t>
+            </a:r>
+            <a:r>
+              <a:rPr lang="it-CH" dirty="0" err="1"/>
+              <a:t>construct</a:t>
+            </a:r>
+            <a:r>
+              <a:rPr lang="it-CH" dirty="0"/>
+              <a:t> </a:t>
+            </a:r>
+            <a:r>
+              <a:rPr lang="it-CH" dirty="0" err="1"/>
+              <a:t>objects</a:t>
+            </a:r>
+            <a:r>
+              <a:rPr lang="it-CH" dirty="0"/>
+              <a:t>:</a:t>
+            </a:r>
+          </a:p>
+          <a:p>
+            <a:r>
+              <a:rPr lang="it-CH" b="1" dirty="0" err="1"/>
+              <a:t>Actuator</a:t>
+            </a:r>
+            <a:r>
+              <a:rPr lang="it-CH" dirty="0"/>
+              <a:t>: Fan, Cooler, and </a:t>
+            </a:r>
+            <a:r>
+              <a:rPr lang="it-CH" dirty="0" err="1"/>
+              <a:t>Heater</a:t>
+            </a:r>
+            <a:r>
+              <a:rPr lang="it-CH" dirty="0"/>
+              <a:t>.</a:t>
+            </a:r>
+          </a:p>
+          <a:p>
+            <a:r>
+              <a:rPr lang="it-CH" b="1" dirty="0"/>
+              <a:t>Chip</a:t>
+            </a:r>
+            <a:r>
+              <a:rPr lang="it-CH" dirty="0"/>
+              <a:t>: Multiplexer and </a:t>
+            </a:r>
+            <a:r>
+              <a:rPr lang="it-CH" dirty="0" err="1"/>
+              <a:t>Analog</a:t>
+            </a:r>
+            <a:r>
+              <a:rPr lang="it-CH" dirty="0"/>
+              <a:t>-to-Digital Converter.</a:t>
+            </a:r>
+          </a:p>
+          <a:p>
+            <a:r>
+              <a:rPr lang="it-CH" b="1" dirty="0"/>
+              <a:t>Controller</a:t>
+            </a:r>
+            <a:r>
+              <a:rPr lang="it-CH" dirty="0"/>
+              <a:t>: To control the system.</a:t>
+            </a:r>
+          </a:p>
+          <a:p>
+            <a:r>
+              <a:rPr lang="it-CH" b="1" dirty="0"/>
+              <a:t>LCD</a:t>
+            </a:r>
+            <a:r>
+              <a:rPr lang="it-CH" dirty="0"/>
+              <a:t>: To </a:t>
+            </a:r>
+            <a:r>
+              <a:rPr lang="it-CH" dirty="0" err="1"/>
+              <a:t>print</a:t>
+            </a:r>
+            <a:r>
+              <a:rPr lang="it-CH" dirty="0"/>
+              <a:t> </a:t>
+            </a:r>
+            <a:r>
+              <a:rPr lang="it-CH" dirty="0" err="1"/>
+              <a:t>values</a:t>
+            </a:r>
+            <a:r>
+              <a:rPr lang="it-CH" dirty="0"/>
+              <a:t> on the screen.</a:t>
+            </a:r>
+          </a:p>
+          <a:p>
+            <a:r>
+              <a:rPr lang="it-CH" b="1" dirty="0"/>
+              <a:t>Saver</a:t>
+            </a:r>
+            <a:r>
+              <a:rPr lang="it-CH" dirty="0"/>
+              <a:t>: To </a:t>
+            </a:r>
+            <a:r>
+              <a:rPr lang="it-CH" dirty="0" err="1"/>
+              <a:t>save</a:t>
+            </a:r>
+            <a:r>
+              <a:rPr lang="it-CH" dirty="0"/>
+              <a:t> </a:t>
+            </a:r>
+            <a:r>
+              <a:rPr lang="it-CH" dirty="0" err="1"/>
+              <a:t>relevant</a:t>
+            </a:r>
+            <a:r>
+              <a:rPr lang="it-CH" dirty="0"/>
+              <a:t> information of the </a:t>
+            </a:r>
+            <a:r>
+              <a:rPr lang="it-CH" dirty="0" err="1"/>
+              <a:t>process</a:t>
+            </a:r>
+            <a:r>
+              <a:rPr lang="it-CH" dirty="0"/>
+              <a:t>.</a:t>
+            </a:r>
+          </a:p>
+          <a:p>
+            <a:r>
+              <a:rPr lang="it-CH" b="1" dirty="0"/>
+              <a:t>Sensor</a:t>
+            </a:r>
+            <a:r>
+              <a:rPr lang="it-CH" dirty="0"/>
+              <a:t>: Clock, Temperature &amp; Relative </a:t>
+            </a:r>
+            <a:r>
+              <a:rPr lang="it-CH" dirty="0" err="1"/>
+              <a:t>Humidity</a:t>
+            </a:r>
+            <a:r>
+              <a:rPr lang="it-CH" dirty="0"/>
+              <a:t>, CO2, NH3, Flow, IR camera, </a:t>
+            </a:r>
+            <a:r>
+              <a:rPr lang="it-CH" dirty="0" err="1"/>
+              <a:t>Thermero</a:t>
+            </a:r>
+            <a:r>
+              <a:rPr lang="it-CH" dirty="0"/>
+              <a:t>, and Scale</a:t>
+            </a:r>
+          </a:p>
+          <a:p>
+            <a:pPr marL="0" indent="0">
+              <a:buNone/>
+            </a:pPr>
+            <a:r>
+              <a:rPr lang="it-CH" b="1" dirty="0" err="1"/>
+              <a:t>Main</a:t>
+            </a:r>
+            <a:r>
+              <a:rPr lang="it-CH" dirty="0"/>
+              <a:t> </a:t>
+            </a:r>
+            <a:r>
+              <a:rPr lang="it-CH" dirty="0" err="1"/>
+              <a:t>contains</a:t>
+            </a:r>
+            <a:r>
+              <a:rPr lang="it-CH" dirty="0"/>
+              <a:t> the code </a:t>
+            </a:r>
+            <a:r>
+              <a:rPr lang="it-CH" dirty="0" err="1"/>
+              <a:t>that</a:t>
+            </a:r>
+            <a:r>
+              <a:rPr lang="it-CH" dirty="0"/>
+              <a:t> </a:t>
+            </a:r>
+            <a:r>
+              <a:rPr lang="it-CH" dirty="0" err="1"/>
+              <a:t>brings</a:t>
+            </a:r>
+            <a:r>
+              <a:rPr lang="it-CH" dirty="0"/>
+              <a:t> all </a:t>
+            </a:r>
+            <a:r>
+              <a:rPr lang="it-CH" dirty="0" err="1"/>
+              <a:t>these</a:t>
+            </a:r>
+            <a:r>
+              <a:rPr lang="it-CH" dirty="0"/>
+              <a:t> </a:t>
+            </a:r>
+            <a:r>
+              <a:rPr lang="it-CH" dirty="0" err="1"/>
+              <a:t>objects</a:t>
+            </a:r>
+            <a:r>
+              <a:rPr lang="it-CH" dirty="0"/>
+              <a:t> </a:t>
+            </a:r>
+            <a:r>
+              <a:rPr lang="it-CH" dirty="0" err="1"/>
+              <a:t>together</a:t>
+            </a:r>
+            <a:r>
+              <a:rPr lang="it-CH" dirty="0"/>
+              <a:t>.</a:t>
+            </a:r>
+          </a:p>
+        </p:txBody>
+      </p:sp>
+    </p:spTree>
+    <p:extLst>
+      <p:ext uri="{BB962C8B-B14F-4D97-AF65-F5344CB8AC3E}">
+        <p14:creationId xmlns:p14="http://schemas.microsoft.com/office/powerpoint/2010/main" val="2056010"/>
+      </p:ext>
+    </p:extLst>
+  </p:cSld>
+  <p:clrMapOvr>
+    <a:masterClrMapping/>
+  </p:clrMapOvr>
+</p:sld>
+</file>
+
+<file path=ppt/slides/slide5.xml><?xml version="1.0" encoding="utf-8"?>
+<p:sld xmlns:a="http://schemas.openxmlformats.org/drawingml/2006/main" xmlns:r="http://schemas.openxmlformats.org/officeDocument/2006/relationships" xmlns:p="http://schemas.openxmlformats.org/presentationml/2006/main">
+  <p:cSld>
+    <p:spTree>
+      <p:nvGrpSpPr>
+        <p:cNvPr id="1" name=""/>
+        <p:cNvGrpSpPr/>
+        <p:nvPr/>
+      </p:nvGrpSpPr>
+      <p:grpSpPr>
+        <a:xfrm>
+          <a:off x="0" y="0"/>
+          <a:ext cx="0" cy="0"/>
+          <a:chOff x="0" y="0"/>
+          <a:chExt cx="0" cy="0"/>
+        </a:xfrm>
+      </p:grpSpPr>
+      <p:sp>
+        <p:nvSpPr>
+          <p:cNvPr id="4" name="Title 3">
+            <a:extLst>
+              <a:ext uri="{FF2B5EF4-FFF2-40B4-BE49-F238E27FC236}">
+                <a16:creationId xmlns:a16="http://schemas.microsoft.com/office/drawing/2014/main" id="{EA9B64C0-1340-A884-3044-2FFFCAAE644C}"/>
+              </a:ext>
+            </a:extLst>
+          </p:cNvPr>
+          <p:cNvSpPr>
+            <a:spLocks noGrp="1"/>
+          </p:cNvSpPr>
+          <p:nvPr>
+            <p:ph type="title"/>
+          </p:nvPr>
+        </p:nvSpPr>
+        <p:spPr/>
+        <p:txBody>
+          <a:bodyPr/>
+          <a:lstStyle/>
+          <a:p>
+            <a:r>
+              <a:rPr lang="it-CH" dirty="0" err="1"/>
+              <a:t>Run</a:t>
+            </a:r>
+            <a:r>
+              <a:rPr lang="it-CH" dirty="0"/>
+              <a:t> Experiment</a:t>
+            </a:r>
+          </a:p>
+        </p:txBody>
+      </p:sp>
+      <p:sp>
+        <p:nvSpPr>
+          <p:cNvPr id="5" name="Text Placeholder 4">
+            <a:extLst>
+              <a:ext uri="{FF2B5EF4-FFF2-40B4-BE49-F238E27FC236}">
+                <a16:creationId xmlns:a16="http://schemas.microsoft.com/office/drawing/2014/main" id="{1978CFC8-578A-471F-F3DA-27D09054C13C}"/>
+              </a:ext>
+            </a:extLst>
+          </p:cNvPr>
+          <p:cNvSpPr>
+            <a:spLocks noGrp="1"/>
+          </p:cNvSpPr>
+          <p:nvPr>
+            <p:ph type="body" idx="1"/>
+          </p:nvPr>
+        </p:nvSpPr>
+        <p:spPr/>
+        <p:txBody>
+          <a:bodyPr/>
+          <a:lstStyle/>
+          <a:p>
+            <a:endParaRPr lang="it-CH"/>
+          </a:p>
+        </p:txBody>
+      </p:sp>
+    </p:spTree>
+    <p:extLst>
+      <p:ext uri="{BB962C8B-B14F-4D97-AF65-F5344CB8AC3E}">
+        <p14:creationId xmlns:p14="http://schemas.microsoft.com/office/powerpoint/2010/main" val="4099287805"/>
+      </p:ext>
+    </p:extLst>
+  </p:cSld>
+  <p:clrMapOvr>
+    <a:masterClrMapping/>
+  </p:clrMapOvr>
+</p:sld>
+</file>
+
+<file path=ppt/slides/slide6.xml><?xml version="1.0" encoding="utf-8"?>
+<p:sld xmlns:a="http://schemas.openxmlformats.org/drawingml/2006/main" xmlns:r="http://schemas.openxmlformats.org/officeDocument/2006/relationships" xmlns:p="http://schemas.openxmlformats.org/presentationml/2006/main">
+  <p:cSld>
+    <p:spTree>
+      <p:nvGrpSpPr>
+        <p:cNvPr id="1" name=""/>
+        <p:cNvGrpSpPr/>
+        <p:nvPr/>
+      </p:nvGrpSpPr>
+      <p:grpSpPr>
+        <a:xfrm>
+          <a:off x="0" y="0"/>
+          <a:ext cx="0" cy="0"/>
+          <a:chOff x="0" y="0"/>
+          <a:chExt cx="0" cy="0"/>
+        </a:xfrm>
+      </p:grpSpPr>
+      <p:sp>
+        <p:nvSpPr>
+          <p:cNvPr id="2" name="Title 1">
+            <a:extLst>
+              <a:ext uri="{FF2B5EF4-FFF2-40B4-BE49-F238E27FC236}">
+                <a16:creationId xmlns:a16="http://schemas.microsoft.com/office/drawing/2014/main" id="{6CA4B7E1-C79A-8ADB-0139-1A29012ABA05}"/>
+              </a:ext>
+            </a:extLst>
+          </p:cNvPr>
+          <p:cNvSpPr>
+            <a:spLocks noGrp="1"/>
+          </p:cNvSpPr>
+          <p:nvPr>
+            <p:ph type="title"/>
+          </p:nvPr>
+        </p:nvSpPr>
+        <p:spPr/>
+        <p:txBody>
+          <a:bodyPr/>
+          <a:lstStyle/>
+          <a:p>
+            <a:r>
+              <a:rPr lang="it-CH" dirty="0"/>
+              <a:t>Power and Cables</a:t>
+            </a:r>
+          </a:p>
+        </p:txBody>
+      </p:sp>
+      <p:sp>
+        <p:nvSpPr>
+          <p:cNvPr id="3" name="Content Placeholder 2">
+            <a:extLst>
+              <a:ext uri="{FF2B5EF4-FFF2-40B4-BE49-F238E27FC236}">
+                <a16:creationId xmlns:a16="http://schemas.microsoft.com/office/drawing/2014/main" id="{73C49911-A0DB-6D50-9F18-B1A189DF99C2}"/>
+              </a:ext>
+            </a:extLst>
+          </p:cNvPr>
+          <p:cNvSpPr>
+            <a:spLocks noGrp="1"/>
+          </p:cNvSpPr>
+          <p:nvPr>
+            <p:ph idx="1"/>
+          </p:nvPr>
+        </p:nvSpPr>
+        <p:spPr/>
+        <p:txBody>
+          <a:bodyPr/>
+          <a:lstStyle/>
+          <a:p>
+            <a:r>
+              <a:rPr lang="it-CH" dirty="0"/>
+              <a:t>Check </a:t>
+            </a:r>
+            <a:r>
+              <a:rPr lang="it-CH" dirty="0" err="1"/>
+              <a:t>that</a:t>
+            </a:r>
+            <a:r>
+              <a:rPr lang="it-CH" dirty="0"/>
+              <a:t> the cables of the </a:t>
+            </a:r>
+            <a:r>
+              <a:rPr lang="it-CH" dirty="0" err="1"/>
+              <a:t>sensors</a:t>
+            </a:r>
+            <a:r>
+              <a:rPr lang="it-CH" dirty="0"/>
+              <a:t> are </a:t>
+            </a:r>
+            <a:r>
+              <a:rPr lang="it-CH" dirty="0" err="1"/>
+              <a:t>connected</a:t>
+            </a:r>
+            <a:r>
+              <a:rPr lang="it-CH" dirty="0"/>
+              <a:t>.</a:t>
+            </a:r>
+          </a:p>
+          <a:p>
+            <a:r>
+              <a:rPr lang="it-CH" dirty="0"/>
+              <a:t>Turn on the power.</a:t>
+            </a:r>
+          </a:p>
+          <a:p>
+            <a:r>
+              <a:rPr lang="it-CH" dirty="0" err="1"/>
+              <a:t>Wait</a:t>
+            </a:r>
+            <a:r>
+              <a:rPr lang="it-CH" dirty="0"/>
+              <a:t> for the screen to show the desktop of the </a:t>
+            </a:r>
+            <a:r>
+              <a:rPr lang="it-CH" dirty="0" err="1"/>
+              <a:t>Raspberry</a:t>
+            </a:r>
+            <a:r>
+              <a:rPr lang="it-CH" dirty="0"/>
+              <a:t> Pi.</a:t>
+            </a:r>
+          </a:p>
+        </p:txBody>
+      </p:sp>
+      <p:pic>
+        <p:nvPicPr>
+          <p:cNvPr id="5" name="Picture 4" descr="A picture containing machine, engineering, drill, tool&#10;&#10;Description automatically generated">
+            <a:extLst>
+              <a:ext uri="{FF2B5EF4-FFF2-40B4-BE49-F238E27FC236}">
+                <a16:creationId xmlns:a16="http://schemas.microsoft.com/office/drawing/2014/main" id="{ED319B9E-6C6B-7A1C-8697-9C50DBCFED6A}"/>
+              </a:ext>
+            </a:extLst>
+          </p:cNvPr>
+          <p:cNvPicPr>
+            <a:picLocks noChangeAspect="1"/>
+          </p:cNvPicPr>
+          <p:nvPr/>
+        </p:nvPicPr>
+        <p:blipFill rotWithShape="1">
+          <a:blip r:embed="rId2">
+            <a:extLst>
+              <a:ext uri="{28A0092B-C50C-407E-A947-70E740481C1C}">
+                <a14:useLocalDpi xmlns:a14="http://schemas.microsoft.com/office/drawing/2010/main" val="0"/>
+              </a:ext>
+            </a:extLst>
+          </a:blip>
+          <a:srcRect l="11195" t="13718" r="48302" b="2760"/>
+          <a:stretch/>
+        </p:blipFill>
+        <p:spPr>
+          <a:xfrm rot="5400000">
+            <a:off x="4468483" y="2669875"/>
+            <a:ext cx="2777706" cy="4295956"/>
+          </a:xfrm>
+          <a:prstGeom prst="rect">
+            <a:avLst/>
+          </a:prstGeom>
+        </p:spPr>
+      </p:pic>
+    </p:spTree>
+    <p:extLst>
+      <p:ext uri="{BB962C8B-B14F-4D97-AF65-F5344CB8AC3E}">
+        <p14:creationId xmlns:p14="http://schemas.microsoft.com/office/powerpoint/2010/main" val="86566441"/>
+      </p:ext>
+    </p:extLst>
+  </p:cSld>
+  <p:clrMapOvr>
+    <a:masterClrMapping/>
+  </p:clrMapOvr>
+</p:sld>
+</file>
+
+<file path=ppt/slides/slide7.xml><?xml version="1.0" encoding="utf-8"?>
+<p:sld xmlns:a="http://schemas.openxmlformats.org/drawingml/2006/main" xmlns:r="http://schemas.openxmlformats.org/officeDocument/2006/relationships" xmlns:p="http://schemas.openxmlformats.org/presentationml/2006/main">
+  <p:cSld>
+    <p:spTree>
+      <p:nvGrpSpPr>
+        <p:cNvPr id="1" name=""/>
+        <p:cNvGrpSpPr/>
+        <p:nvPr/>
+      </p:nvGrpSpPr>
+      <p:grpSpPr>
+        <a:xfrm>
+          <a:off x="0" y="0"/>
+          <a:ext cx="0" cy="0"/>
+          <a:chOff x="0" y="0"/>
+          <a:chExt cx="0" cy="0"/>
+        </a:xfrm>
+      </p:grpSpPr>
+      <p:sp>
+        <p:nvSpPr>
+          <p:cNvPr id="2" name="Title 1">
+            <a:extLst>
+              <a:ext uri="{FF2B5EF4-FFF2-40B4-BE49-F238E27FC236}">
+                <a16:creationId xmlns:a16="http://schemas.microsoft.com/office/drawing/2014/main" id="{A7DD7B8A-3332-3D97-56CB-527CE6E15932}"/>
+              </a:ext>
+            </a:extLst>
+          </p:cNvPr>
+          <p:cNvSpPr>
+            <a:spLocks noGrp="1"/>
+          </p:cNvSpPr>
+          <p:nvPr>
+            <p:ph type="title"/>
+          </p:nvPr>
+        </p:nvSpPr>
+        <p:spPr/>
+        <p:txBody>
+          <a:bodyPr/>
+          <a:lstStyle/>
+          <a:p>
+            <a:r>
+              <a:rPr lang="it-CH" dirty="0" err="1"/>
+              <a:t>Process</a:t>
+            </a:r>
+            <a:endParaRPr lang="it-CH" dirty="0"/>
+          </a:p>
+        </p:txBody>
+      </p:sp>
+      <p:sp>
+        <p:nvSpPr>
+          <p:cNvPr id="3" name="Content Placeholder 2">
+            <a:extLst>
+              <a:ext uri="{FF2B5EF4-FFF2-40B4-BE49-F238E27FC236}">
+                <a16:creationId xmlns:a16="http://schemas.microsoft.com/office/drawing/2014/main" id="{CE67BDDA-1386-EC43-BBB5-309666F87DA7}"/>
+              </a:ext>
+            </a:extLst>
+          </p:cNvPr>
+          <p:cNvSpPr>
+            <a:spLocks noGrp="1"/>
+          </p:cNvSpPr>
+          <p:nvPr>
+            <p:ph idx="1"/>
+          </p:nvPr>
+        </p:nvSpPr>
+        <p:spPr/>
+        <p:txBody>
+          <a:bodyPr/>
+          <a:lstStyle/>
+          <a:p>
+            <a:pPr marL="514350" indent="-514350">
+              <a:buFont typeface="+mj-lt"/>
+              <a:buAutoNum type="arabicPeriod"/>
+            </a:pPr>
+            <a:r>
+              <a:rPr lang="it-CH" dirty="0"/>
+              <a:t>Open «PALMY» folder (Double-Click).</a:t>
+            </a:r>
+          </a:p>
+          <a:p>
+            <a:pPr marL="514350" indent="-514350">
+              <a:buFont typeface="+mj-lt"/>
+              <a:buAutoNum type="arabicPeriod"/>
+            </a:pPr>
+            <a:r>
+              <a:rPr lang="it-CH" dirty="0"/>
+              <a:t>Open «Main.py» on </a:t>
+            </a:r>
+            <a:r>
+              <a:rPr lang="it-CH" dirty="0" err="1"/>
+              <a:t>Thonny</a:t>
+            </a:r>
+            <a:r>
+              <a:rPr lang="it-CH" dirty="0"/>
+              <a:t> (Double-Click or Open With).</a:t>
+            </a:r>
+          </a:p>
+          <a:p>
+            <a:pPr marL="514350" indent="-514350">
+              <a:buFont typeface="+mj-lt"/>
+              <a:buAutoNum type="arabicPeriod"/>
+            </a:pPr>
+            <a:r>
+              <a:rPr lang="it-CH" dirty="0" err="1"/>
+              <a:t>Run</a:t>
+            </a:r>
+            <a:r>
+              <a:rPr lang="it-CH" dirty="0"/>
+              <a:t> the code (Press F5 or the green play </a:t>
+            </a:r>
+            <a:r>
+              <a:rPr lang="it-CH" dirty="0" err="1"/>
+              <a:t>button</a:t>
+            </a:r>
+            <a:r>
+              <a:rPr lang="it-CH" dirty="0"/>
+              <a:t>).</a:t>
+            </a:r>
+          </a:p>
+          <a:p>
+            <a:pPr marL="514350" indent="-514350">
+              <a:buFont typeface="+mj-lt"/>
+              <a:buAutoNum type="arabicPeriod"/>
+            </a:pPr>
+            <a:r>
+              <a:rPr lang="it-CH" dirty="0" err="1"/>
+              <a:t>Answer</a:t>
+            </a:r>
+            <a:r>
+              <a:rPr lang="it-CH" dirty="0"/>
+              <a:t> the </a:t>
+            </a:r>
+            <a:r>
+              <a:rPr lang="it-CH" dirty="0" err="1"/>
+              <a:t>questions</a:t>
+            </a:r>
+            <a:r>
+              <a:rPr lang="it-CH" dirty="0"/>
+              <a:t> on the screen </a:t>
+            </a:r>
+            <a:r>
+              <a:rPr lang="it-CH" dirty="0" err="1"/>
+              <a:t>until</a:t>
+            </a:r>
+            <a:r>
+              <a:rPr lang="it-CH" dirty="0"/>
+              <a:t> the </a:t>
+            </a:r>
+            <a:r>
+              <a:rPr lang="it-CH" dirty="0" err="1"/>
+              <a:t>process</a:t>
+            </a:r>
+            <a:r>
+              <a:rPr lang="it-CH" dirty="0"/>
+              <a:t> </a:t>
+            </a:r>
+            <a:r>
+              <a:rPr lang="it-CH" dirty="0" err="1"/>
+              <a:t>is</a:t>
+            </a:r>
+            <a:r>
+              <a:rPr lang="it-CH" dirty="0"/>
+              <a:t> </a:t>
+            </a:r>
+            <a:r>
+              <a:rPr lang="it-CH" dirty="0" err="1"/>
+              <a:t>started</a:t>
+            </a:r>
+            <a:r>
+              <a:rPr lang="it-CH" dirty="0"/>
+              <a:t>.</a:t>
+            </a:r>
+          </a:p>
+          <a:p>
+            <a:pPr marL="514350" indent="-514350">
+              <a:buFont typeface="+mj-lt"/>
+              <a:buAutoNum type="arabicPeriod"/>
+            </a:pPr>
+            <a:r>
+              <a:rPr lang="it-CH" dirty="0"/>
+              <a:t>To stop the </a:t>
+            </a:r>
+            <a:r>
+              <a:rPr lang="it-CH" dirty="0" err="1"/>
+              <a:t>process</a:t>
+            </a:r>
+            <a:r>
+              <a:rPr lang="it-CH" dirty="0"/>
+              <a:t> press CTRL + C.</a:t>
+            </a:r>
+            <a:br>
+              <a:rPr lang="it-CH" dirty="0"/>
+            </a:br>
+            <a:r>
+              <a:rPr lang="it-CH" dirty="0"/>
+              <a:t>Do </a:t>
+            </a:r>
+            <a:r>
+              <a:rPr lang="it-CH" b="1" dirty="0"/>
+              <a:t>NOT</a:t>
+            </a:r>
+            <a:r>
+              <a:rPr lang="it-CH" dirty="0"/>
+              <a:t> press the </a:t>
+            </a:r>
+            <a:r>
+              <a:rPr lang="it-CH" b="1" dirty="0"/>
+              <a:t>red stop </a:t>
+            </a:r>
+            <a:r>
+              <a:rPr lang="it-CH" b="1" dirty="0" err="1"/>
+              <a:t>button</a:t>
+            </a:r>
+            <a:r>
+              <a:rPr lang="it-CH" dirty="0"/>
+              <a:t>! The data </a:t>
+            </a:r>
+            <a:r>
+              <a:rPr lang="it-CH" dirty="0" err="1"/>
+              <a:t>won’t</a:t>
+            </a:r>
+            <a:r>
+              <a:rPr lang="it-CH" dirty="0"/>
+              <a:t> be </a:t>
+            </a:r>
+            <a:r>
+              <a:rPr lang="it-CH" dirty="0" err="1"/>
+              <a:t>saved</a:t>
+            </a:r>
+            <a:r>
+              <a:rPr lang="it-CH" dirty="0"/>
+              <a:t> and the </a:t>
+            </a:r>
+            <a:r>
+              <a:rPr lang="it-CH" dirty="0" err="1"/>
+              <a:t>Heater</a:t>
+            </a:r>
+            <a:r>
+              <a:rPr lang="it-CH" dirty="0"/>
+              <a:t> and Cooler </a:t>
+            </a:r>
+            <a:r>
+              <a:rPr lang="it-CH" dirty="0" err="1"/>
+              <a:t>will</a:t>
+            </a:r>
+            <a:r>
+              <a:rPr lang="it-CH" dirty="0"/>
+              <a:t> continue to </a:t>
+            </a:r>
+            <a:r>
+              <a:rPr lang="it-CH" dirty="0" err="1"/>
+              <a:t>run</a:t>
+            </a:r>
+            <a:r>
+              <a:rPr lang="it-CH" dirty="0"/>
+              <a:t>.</a:t>
+            </a:r>
+          </a:p>
+        </p:txBody>
+      </p:sp>
+    </p:spTree>
+    <p:extLst>
+      <p:ext uri="{BB962C8B-B14F-4D97-AF65-F5344CB8AC3E}">
+        <p14:creationId xmlns:p14="http://schemas.microsoft.com/office/powerpoint/2010/main" val="1976787187"/>
+      </p:ext>
+    </p:extLst>
+  </p:cSld>
+  <p:clrMapOvr>
+    <a:masterClrMapping/>
+  </p:clrMapOvr>
+</p:sld>
+</file>
+
+<file path=ppt/slides/slide8.xml><?xml version="1.0" encoding="utf-8"?>
+<p:sld xmlns:a="http://schemas.openxmlformats.org/drawingml/2006/main" xmlns:r="http://schemas.openxmlformats.org/officeDocument/2006/relationships" xmlns:p="http://schemas.openxmlformats.org/presentationml/2006/main">
+  <p:cSld>
+    <p:spTree>
+      <p:nvGrpSpPr>
+        <p:cNvPr id="1" name=""/>
+        <p:cNvGrpSpPr/>
+        <p:nvPr/>
+      </p:nvGrpSpPr>
+      <p:grpSpPr>
+        <a:xfrm>
+          <a:off x="0" y="0"/>
+          <a:ext cx="0" cy="0"/>
+          <a:chOff x="0" y="0"/>
+          <a:chExt cx="0" cy="0"/>
+        </a:xfrm>
+      </p:grpSpPr>
+      <p:sp>
+        <p:nvSpPr>
+          <p:cNvPr id="4" name="Title 3">
+            <a:extLst>
+              <a:ext uri="{FF2B5EF4-FFF2-40B4-BE49-F238E27FC236}">
+                <a16:creationId xmlns:a16="http://schemas.microsoft.com/office/drawing/2014/main" id="{EA9B64C0-1340-A884-3044-2FFFCAAE644C}"/>
+              </a:ext>
+            </a:extLst>
+          </p:cNvPr>
+          <p:cNvSpPr>
+            <a:spLocks noGrp="1"/>
+          </p:cNvSpPr>
+          <p:nvPr>
+            <p:ph type="title"/>
+          </p:nvPr>
+        </p:nvSpPr>
+        <p:spPr/>
+        <p:txBody>
+          <a:bodyPr/>
+          <a:lstStyle/>
+          <a:p>
+            <a:r>
+              <a:rPr lang="it-CH" dirty="0" err="1"/>
+              <a:t>Errors</a:t>
+            </a:r>
+            <a:endParaRPr lang="it-CH" dirty="0"/>
+          </a:p>
+        </p:txBody>
+      </p:sp>
+      <p:sp>
+        <p:nvSpPr>
+          <p:cNvPr id="5" name="Text Placeholder 4">
+            <a:extLst>
+              <a:ext uri="{FF2B5EF4-FFF2-40B4-BE49-F238E27FC236}">
+                <a16:creationId xmlns:a16="http://schemas.microsoft.com/office/drawing/2014/main" id="{1978CFC8-578A-471F-F3DA-27D09054C13C}"/>
+              </a:ext>
+            </a:extLst>
+          </p:cNvPr>
+          <p:cNvSpPr>
+            <a:spLocks noGrp="1"/>
+          </p:cNvSpPr>
+          <p:nvPr>
+            <p:ph type="body" idx="1"/>
+          </p:nvPr>
+        </p:nvSpPr>
+        <p:spPr/>
+        <p:txBody>
+          <a:bodyPr/>
+          <a:lstStyle/>
+          <a:p>
+            <a:r>
+              <a:rPr lang="it-CH" dirty="0"/>
+              <a:t>All the </a:t>
+            </a:r>
+            <a:r>
+              <a:rPr lang="it-CH" dirty="0" err="1"/>
+              <a:t>sensors</a:t>
+            </a:r>
+            <a:r>
+              <a:rPr lang="it-CH" dirty="0"/>
+              <a:t> can </a:t>
+            </a:r>
+            <a:r>
+              <a:rPr lang="it-CH" dirty="0" err="1"/>
+              <a:t>encounter</a:t>
+            </a:r>
+            <a:r>
+              <a:rPr lang="it-CH" dirty="0"/>
+              <a:t> </a:t>
+            </a:r>
+            <a:r>
+              <a:rPr lang="it-CH" dirty="0" err="1"/>
+              <a:t>error</a:t>
+            </a:r>
+            <a:r>
+              <a:rPr lang="it-CH" dirty="0"/>
+              <a:t>. </a:t>
+            </a:r>
+            <a:r>
+              <a:rPr lang="it-CH" dirty="0" err="1"/>
+              <a:t>Normally</a:t>
+            </a:r>
+            <a:r>
+              <a:rPr lang="it-CH" dirty="0"/>
+              <a:t>, by </a:t>
+            </a:r>
+            <a:r>
+              <a:rPr lang="it-CH" dirty="0" err="1"/>
+              <a:t>moving</a:t>
+            </a:r>
+            <a:r>
+              <a:rPr lang="it-CH" dirty="0"/>
+              <a:t> the cables, re-running the </a:t>
+            </a:r>
+            <a:r>
+              <a:rPr lang="it-CH" dirty="0" err="1"/>
+              <a:t>program</a:t>
+            </a:r>
+            <a:r>
+              <a:rPr lang="it-CH" dirty="0"/>
+              <a:t>, or turn off and turn on PALMY </a:t>
+            </a:r>
+            <a:r>
+              <a:rPr lang="it-CH" dirty="0" err="1"/>
+              <a:t>they</a:t>
+            </a:r>
+            <a:r>
+              <a:rPr lang="it-CH" dirty="0"/>
+              <a:t> </a:t>
+            </a:r>
+            <a:r>
+              <a:rPr lang="it-CH" dirty="0" err="1"/>
+              <a:t>will</a:t>
+            </a:r>
+            <a:r>
+              <a:rPr lang="it-CH" dirty="0"/>
+              <a:t> work </a:t>
+            </a:r>
+            <a:r>
+              <a:rPr lang="it-CH" dirty="0" err="1"/>
+              <a:t>again</a:t>
+            </a:r>
+            <a:r>
+              <a:rPr lang="it-CH" dirty="0"/>
+              <a:t>.</a:t>
+            </a:r>
+          </a:p>
+        </p:txBody>
+      </p:sp>
+    </p:spTree>
+    <p:extLst>
+      <p:ext uri="{BB962C8B-B14F-4D97-AF65-F5344CB8AC3E}">
+        <p14:creationId xmlns:p14="http://schemas.microsoft.com/office/powerpoint/2010/main" val="375129123"/>
+      </p:ext>
+    </p:extLst>
+  </p:cSld>
+  <p:clrMapOvr>
+    <a:masterClrMapping/>
+  </p:clrMapOvr>
+</p:sld>
+</file>
+
+<file path=ppt/slides/slide9.xml><?xml version="1.0" encoding="utf-8"?>
+<p:sld xmlns:a="http://schemas.openxmlformats.org/drawingml/2006/main" xmlns:r="http://schemas.openxmlformats.org/officeDocument/2006/relationships" xmlns:p="http://schemas.openxmlformats.org/presentationml/2006/main">
+  <p:cSld>
+    <p:spTree>
+      <p:nvGrpSpPr>
+        <p:cNvPr id="1" name=""/>
+        <p:cNvGrpSpPr/>
+        <p:nvPr/>
+      </p:nvGrpSpPr>
+      <p:grpSpPr>
+        <a:xfrm>
+          <a:off x="0" y="0"/>
+          <a:ext cx="0" cy="0"/>
+          <a:chOff x="0" y="0"/>
+          <a:chExt cx="0" cy="0"/>
+        </a:xfrm>
+      </p:grpSpPr>
+      <p:sp>
+        <p:nvSpPr>
+          <p:cNvPr id="2" name="Title 1">
+            <a:extLst>
+              <a:ext uri="{FF2B5EF4-FFF2-40B4-BE49-F238E27FC236}">
+                <a16:creationId xmlns:a16="http://schemas.microsoft.com/office/drawing/2014/main" id="{C0020E6C-3265-71C7-493B-CB588D88589A}"/>
+              </a:ext>
+            </a:extLst>
+          </p:cNvPr>
+          <p:cNvSpPr>
+            <a:spLocks noGrp="1"/>
+          </p:cNvSpPr>
+          <p:nvPr>
+            <p:ph type="title"/>
+          </p:nvPr>
+        </p:nvSpPr>
+        <p:spPr/>
+        <p:txBody>
+          <a:bodyPr/>
+          <a:lstStyle/>
+          <a:p>
+            <a:r>
+              <a:rPr lang="it-CH" dirty="0"/>
+              <a:t>NH3out</a:t>
+            </a:r>
+          </a:p>
+        </p:txBody>
+      </p:sp>
+      <p:sp>
+        <p:nvSpPr>
+          <p:cNvPr id="3" name="Content Placeholder 2">
+            <a:extLst>
+              <a:ext uri="{FF2B5EF4-FFF2-40B4-BE49-F238E27FC236}">
+                <a16:creationId xmlns:a16="http://schemas.microsoft.com/office/drawing/2014/main" id="{4CC42C20-E8C8-A290-0CA3-37F583EDEAF6}"/>
+              </a:ext>
+            </a:extLst>
+          </p:cNvPr>
+          <p:cNvSpPr>
+            <a:spLocks noGrp="1"/>
+          </p:cNvSpPr>
+          <p:nvPr>
+            <p:ph idx="1"/>
+          </p:nvPr>
+        </p:nvSpPr>
+        <p:spPr/>
+        <p:txBody>
+          <a:bodyPr/>
+          <a:lstStyle/>
+          <a:p>
+            <a:r>
+              <a:rPr lang="it-CH" dirty="0"/>
+              <a:t>The NH3 </a:t>
+            </a:r>
+            <a:r>
+              <a:rPr lang="it-CH" dirty="0" err="1"/>
+              <a:t>at</a:t>
+            </a:r>
+            <a:r>
+              <a:rPr lang="it-CH" dirty="0"/>
+              <a:t> the outlet shows some hardware </a:t>
+            </a:r>
+            <a:r>
+              <a:rPr lang="it-CH" dirty="0" err="1"/>
+              <a:t>problems</a:t>
+            </a:r>
+            <a:r>
+              <a:rPr lang="it-CH" dirty="0"/>
+              <a:t> and </a:t>
+            </a:r>
+            <a:r>
+              <a:rPr lang="it-CH" dirty="0" err="1"/>
+              <a:t>is</a:t>
+            </a:r>
+            <a:r>
+              <a:rPr lang="it-CH" dirty="0"/>
+              <a:t> for </a:t>
+            </a:r>
+            <a:r>
+              <a:rPr lang="it-CH" dirty="0" err="1"/>
+              <a:t>this</a:t>
+            </a:r>
+            <a:r>
+              <a:rPr lang="it-CH" dirty="0"/>
+              <a:t> </a:t>
+            </a:r>
+            <a:r>
+              <a:rPr lang="it-CH" dirty="0" err="1"/>
+              <a:t>reason</a:t>
+            </a:r>
+            <a:r>
+              <a:rPr lang="it-CH" dirty="0"/>
+              <a:t> </a:t>
+            </a:r>
+            <a:r>
+              <a:rPr lang="it-CH" dirty="0" err="1"/>
+              <a:t>not</a:t>
+            </a:r>
+            <a:r>
+              <a:rPr lang="it-CH" dirty="0"/>
+              <a:t> set up. At line 92 you can </a:t>
+            </a:r>
+            <a:r>
+              <a:rPr lang="it-CH" dirty="0" err="1"/>
+              <a:t>see</a:t>
+            </a:r>
+            <a:r>
+              <a:rPr lang="it-CH" dirty="0"/>
+              <a:t> «</a:t>
+            </a:r>
+            <a:r>
+              <a:rPr lang="it-CH" b="0" dirty="0">
+                <a:solidFill>
+                  <a:srgbClr val="9CDCFE"/>
+                </a:solidFill>
+                <a:effectLst/>
+                <a:latin typeface="Consolas" panose="020B0609020204030204" pitchFamily="49" charset="0"/>
+              </a:rPr>
+              <a:t>NH3out</a:t>
+            </a:r>
+            <a:r>
+              <a:rPr lang="it-CH" b="0" dirty="0">
+                <a:solidFill>
+                  <a:srgbClr val="CCCCCC"/>
+                </a:solidFill>
+                <a:effectLst/>
+                <a:latin typeface="Consolas" panose="020B0609020204030204" pitchFamily="49" charset="0"/>
+              </a:rPr>
+              <a:t> </a:t>
+            </a:r>
+            <a:r>
+              <a:rPr lang="it-CH" b="0" dirty="0">
+                <a:solidFill>
+                  <a:srgbClr val="D4D4D4"/>
+                </a:solidFill>
+                <a:effectLst/>
+                <a:latin typeface="Consolas" panose="020B0609020204030204" pitchFamily="49" charset="0"/>
+              </a:rPr>
+              <a:t>=</a:t>
+            </a:r>
+            <a:r>
+              <a:rPr lang="it-CH" b="0" dirty="0">
+                <a:solidFill>
+                  <a:srgbClr val="CCCCCC"/>
+                </a:solidFill>
+                <a:effectLst/>
+                <a:latin typeface="Consolas" panose="020B0609020204030204" pitchFamily="49" charset="0"/>
+              </a:rPr>
+              <a:t> </a:t>
+            </a:r>
+            <a:r>
+              <a:rPr lang="it-CH" b="0" dirty="0">
+                <a:solidFill>
+                  <a:srgbClr val="569CD6"/>
+                </a:solidFill>
+                <a:effectLst/>
+                <a:latin typeface="Consolas" panose="020B0609020204030204" pitchFamily="49" charset="0"/>
+              </a:rPr>
+              <a:t>None</a:t>
+            </a:r>
+            <a:r>
+              <a:rPr lang="it-CH" dirty="0"/>
+              <a:t>»</a:t>
+            </a:r>
+          </a:p>
+          <a:p>
+            <a:r>
+              <a:rPr lang="it-CH" dirty="0"/>
+              <a:t>You can use the </a:t>
+            </a:r>
+            <a:r>
+              <a:rPr lang="it-CH" dirty="0" err="1"/>
+              <a:t>same</a:t>
+            </a:r>
+            <a:r>
+              <a:rPr lang="it-CH" dirty="0"/>
+              <a:t> idea to </a:t>
+            </a:r>
+            <a:r>
+              <a:rPr lang="it-CH" dirty="0" err="1"/>
+              <a:t>manually</a:t>
+            </a:r>
+            <a:r>
+              <a:rPr lang="it-CH" dirty="0"/>
+              <a:t> </a:t>
+            </a:r>
+            <a:r>
+              <a:rPr lang="it-CH" dirty="0" err="1"/>
+              <a:t>deactivate</a:t>
+            </a:r>
+            <a:r>
+              <a:rPr lang="it-CH" dirty="0"/>
+              <a:t> some </a:t>
+            </a:r>
+            <a:r>
+              <a:rPr lang="it-CH" dirty="0" err="1"/>
+              <a:t>sensors</a:t>
+            </a:r>
+            <a:r>
+              <a:rPr lang="it-CH" dirty="0"/>
+              <a:t>.</a:t>
+            </a:r>
+            <a:br>
+              <a:rPr lang="it-CH" dirty="0"/>
+            </a:br>
+            <a:r>
+              <a:rPr lang="it-CH" dirty="0" err="1"/>
+              <a:t>Example</a:t>
+            </a:r>
+            <a:r>
+              <a:rPr lang="it-CH" dirty="0"/>
+              <a:t>: If you do </a:t>
+            </a:r>
+            <a:r>
+              <a:rPr lang="it-CH" dirty="0" err="1"/>
+              <a:t>not</a:t>
+            </a:r>
+            <a:r>
+              <a:rPr lang="it-CH" dirty="0"/>
+              <a:t> </a:t>
+            </a:r>
+            <a:r>
+              <a:rPr lang="it-CH" dirty="0" err="1"/>
+              <a:t>want</a:t>
+            </a:r>
+            <a:r>
+              <a:rPr lang="it-CH" dirty="0"/>
+              <a:t> the Flow </a:t>
+            </a:r>
+            <a:r>
+              <a:rPr lang="it-CH" dirty="0" err="1"/>
+              <a:t>sensor</a:t>
+            </a:r>
+            <a:r>
+              <a:rPr lang="it-CH" dirty="0"/>
+              <a:t>, you can </a:t>
+            </a:r>
+            <a:r>
+              <a:rPr lang="it-CH" dirty="0" err="1"/>
+              <a:t>type</a:t>
+            </a:r>
+            <a:r>
+              <a:rPr lang="it-CH" dirty="0"/>
+              <a:t> «</a:t>
+            </a:r>
+            <a:r>
+              <a:rPr lang="it-CH" b="0" dirty="0">
+                <a:solidFill>
+                  <a:srgbClr val="9CDCFE"/>
+                </a:solidFill>
+                <a:effectLst/>
+                <a:latin typeface="Consolas" panose="020B0609020204030204" pitchFamily="49" charset="0"/>
+              </a:rPr>
+              <a:t>Flow</a:t>
+            </a:r>
+            <a:r>
+              <a:rPr lang="it-CH" b="0" dirty="0">
+                <a:solidFill>
+                  <a:srgbClr val="CCCCCC"/>
+                </a:solidFill>
+                <a:effectLst/>
+                <a:latin typeface="Consolas" panose="020B0609020204030204" pitchFamily="49" charset="0"/>
+              </a:rPr>
+              <a:t> </a:t>
+            </a:r>
+            <a:r>
+              <a:rPr lang="it-CH" b="0" dirty="0">
+                <a:solidFill>
+                  <a:srgbClr val="D4D4D4"/>
+                </a:solidFill>
+                <a:effectLst/>
+                <a:latin typeface="Consolas" panose="020B0609020204030204" pitchFamily="49" charset="0"/>
+              </a:rPr>
+              <a:t>=</a:t>
+            </a:r>
+            <a:r>
+              <a:rPr lang="it-CH" b="0" dirty="0">
+                <a:solidFill>
+                  <a:srgbClr val="CCCCCC"/>
+                </a:solidFill>
+                <a:effectLst/>
+                <a:latin typeface="Consolas" panose="020B0609020204030204" pitchFamily="49" charset="0"/>
+              </a:rPr>
+              <a:t> </a:t>
+            </a:r>
+            <a:r>
+              <a:rPr lang="it-CH" b="0" dirty="0">
+                <a:solidFill>
+                  <a:srgbClr val="569CD6"/>
+                </a:solidFill>
+                <a:effectLst/>
+                <a:latin typeface="Consolas" panose="020B0609020204030204" pitchFamily="49" charset="0"/>
+              </a:rPr>
+              <a:t>None</a:t>
+            </a:r>
+            <a:r>
+              <a:rPr lang="it-CH" dirty="0"/>
+              <a:t>» after line 83.</a:t>
+            </a:r>
+          </a:p>
+          <a:p>
+            <a:endParaRPr lang="it-CH" dirty="0"/>
+          </a:p>
+        </p:txBody>
+      </p:sp>
+    </p:spTree>
+    <p:extLst>
+      <p:ext uri="{BB962C8B-B14F-4D97-AF65-F5344CB8AC3E}">
+        <p14:creationId xmlns:p14="http://schemas.microsoft.com/office/powerpoint/2010/main" val="2658779310"/>
       </p:ext>
     </p:extLst>
   </p:cSld>

</xml_diff>